<commit_message>
Update of Termin 5.
</commit_message>
<xml_diff>
--- a/Termin_6/folien/UebungModellierung#6.pptx
+++ b/Termin_6/folien/UebungModellierung#6.pptx
@@ -17,8 +17,8 @@
     <p:sldId id="980" r:id="rId5"/>
     <p:sldId id="981" r:id="rId6"/>
     <p:sldId id="985" r:id="rId7"/>
-    <p:sldId id="982" r:id="rId8"/>
-    <p:sldId id="983" r:id="rId9"/>
+    <p:sldId id="987" r:id="rId8"/>
+    <p:sldId id="986" r:id="rId9"/>
     <p:sldId id="984" r:id="rId10"/>
   </p:sldIdLst>
   <p:sldSz cx="9144000" cy="6858000" type="screen4x3"/>
@@ -395,7 +395,7 @@
     </p:spTree>
     <p:extLst>
       <p:ext uri="{BB962C8B-B14F-4D97-AF65-F5344CB8AC3E}">
-        <p14:creationId xmlns="" xmlns:p14="http://schemas.microsoft.com/office/powerpoint/2010/main" val="1882660213"/>
+        <p14:creationId xmlns:p14="http://schemas.microsoft.com/office/powerpoint/2010/main" xmlns="" val="1882660213"/>
       </p:ext>
     </p:extLst>
   </p:cSld>
@@ -734,7 +734,7 @@
     </p:spTree>
     <p:extLst>
       <p:ext uri="{BB962C8B-B14F-4D97-AF65-F5344CB8AC3E}">
-        <p14:creationId xmlns="" xmlns:p14="http://schemas.microsoft.com/office/powerpoint/2010/main" val="2781074432"/>
+        <p14:creationId xmlns:p14="http://schemas.microsoft.com/office/powerpoint/2010/main" xmlns="" val="2781074432"/>
       </p:ext>
     </p:extLst>
   </p:cSld>
@@ -4892,17 +4892,8 @@
               <a:rPr lang="de-DE" sz="2400" dirty="0" smtClean="0">
                 <a:latin typeface="Calibri" pitchFamily="34" charset="0"/>
               </a:rPr>
-              <a:t>R als Werkzeug in der </a:t>
-            </a:r>
-            <a:r>
-              <a:rPr lang="de-DE" sz="2400" dirty="0" smtClean="0">
-                <a:latin typeface="Calibri" pitchFamily="34" charset="0"/>
-              </a:rPr>
-              <a:t>Modellierung </a:t>
-            </a:r>
-            <a:endParaRPr lang="de-DE" sz="2400" dirty="0" smtClean="0">
-              <a:latin typeface="Calibri" pitchFamily="34" charset="0"/>
-            </a:endParaRPr>
+              <a:t>R als Werkzeug in der Modellierung </a:t>
+            </a:r>
           </a:p>
           <a:p>
             <a:pPr marL="269875" indent="-269875" algn="ctr">
@@ -4914,13 +4905,7 @@
               <a:rPr lang="de-DE" sz="2400" dirty="0" smtClean="0">
                 <a:latin typeface="Calibri" pitchFamily="34" charset="0"/>
               </a:rPr>
-              <a:t>Ökologische </a:t>
-            </a:r>
-            <a:r>
-              <a:rPr lang="de-DE" sz="2400" dirty="0" smtClean="0">
-                <a:latin typeface="Calibri" pitchFamily="34" charset="0"/>
-              </a:rPr>
-              <a:t>Modelle</a:t>
+              <a:t>Ökologische Modelle</a:t>
             </a:r>
           </a:p>
           <a:p>
@@ -5211,7 +5196,7 @@
         <p:spPr>
           <a:xfrm>
             <a:off x="1" y="2276872"/>
-            <a:ext cx="9108504" cy="2693045"/>
+            <a:ext cx="9108504" cy="1800493"/>
           </a:xfrm>
           <a:prstGeom prst="rect">
             <a:avLst/>
@@ -5277,40 +5262,61 @@
               </a:spcAft>
             </a:pPr>
             <a:r>
+              <a:rPr lang="de-DE" sz="2400" dirty="0" err="1" smtClean="0">
+                <a:latin typeface="Calibri" pitchFamily="34" charset="0"/>
+              </a:rPr>
+              <a:t>Hyd</a:t>
+            </a:r>
+            <a:r>
               <a:rPr lang="de-DE" sz="2400" dirty="0" smtClean="0">
                 <a:latin typeface="Calibri" pitchFamily="34" charset="0"/>
               </a:rPr>
-              <a:t>Kalibrierung und Validierung</a:t>
-            </a:r>
-          </a:p>
-          <a:p>
-            <a:pPr marL="269875" indent="-269875" algn="ctr">
-              <a:spcAft>
-                <a:spcPts val="600"/>
-              </a:spcAft>
-            </a:pPr>
+              <a:t>    </a:t>
+            </a:r>
+            <a:r>
+              <a:rPr lang="de-DE" sz="2400" baseline="-25000" dirty="0" smtClean="0">
+                <a:latin typeface="Calibri" pitchFamily="34" charset="0"/>
+              </a:rPr>
+              <a:t> </a:t>
+            </a:r>
             <a:r>
               <a:rPr lang="de-DE" sz="2400" dirty="0" smtClean="0">
                 <a:latin typeface="Calibri" pitchFamily="34" charset="0"/>
               </a:rPr>
-              <a:t>(Erweiterung des abcd-Modells)</a:t>
-            </a:r>
-          </a:p>
-          <a:p>
-            <a:pPr marL="269875" indent="-269875" algn="ctr">
-              <a:spcAft>
-                <a:spcPts val="600"/>
-              </a:spcAft>
-            </a:pPr>
-            <a:r>
-              <a:rPr lang="de-DE" sz="2400" dirty="0" smtClean="0">
-                <a:latin typeface="Calibri" pitchFamily="34" charset="0"/>
-              </a:rPr>
-              <a:t>Abschlussquiz Hydrologie</a:t>
-            </a:r>
+              <a:t>o-Quiz</a:t>
+            </a:r>
+            <a:endParaRPr lang="de-DE" sz="2400" dirty="0" smtClean="0">
+              <a:latin typeface="Calibri" pitchFamily="34" charset="0"/>
+            </a:endParaRPr>
           </a:p>
         </p:txBody>
       </p:sp>
+      <p:pic>
+        <p:nvPicPr>
+          <p:cNvPr id="8" name="Picture 2" descr="http://developer.r-project.org/Logo/Rlogo-1.png"/>
+          <p:cNvPicPr>
+            <a:picLocks noChangeAspect="1" noChangeArrowheads="1"/>
+          </p:cNvPicPr>
+          <p:nvPr/>
+        </p:nvPicPr>
+        <p:blipFill>
+          <a:blip r:embed="rId5" cstate="print"/>
+          <a:srcRect/>
+          <a:stretch>
+            <a:fillRect/>
+          </a:stretch>
+        </p:blipFill>
+        <p:spPr bwMode="auto">
+          <a:xfrm>
+            <a:off x="4237360" y="3703298"/>
+            <a:ext cx="314078" cy="238266"/>
+          </a:xfrm>
+          <a:prstGeom prst="rect">
+            <a:avLst/>
+          </a:prstGeom>
+          <a:noFill/>
+        </p:spPr>
+      </p:pic>
     </p:spTree>
   </p:cSld>
   <p:clrMapOvr>
@@ -6368,7 +6374,19 @@
               <a:rPr lang="de-DE" sz="2000" dirty="0" smtClean="0">
                 <a:latin typeface="Calibri" pitchFamily="34" charset="0"/>
               </a:rPr>
-              <a:t>Einfluss der Gebietsfeuchte ‚</a:t>
+              <a:t>Einfluss der </a:t>
+            </a:r>
+            <a:r>
+              <a:rPr lang="de-DE" sz="2000" dirty="0" smtClean="0">
+                <a:latin typeface="Calibri" pitchFamily="34" charset="0"/>
+              </a:rPr>
+              <a:t>Gebietsfeuchte</a:t>
+            </a:r>
+            <a:r>
+              <a:rPr lang="de-DE" sz="2000" dirty="0" smtClean="0">
+                <a:latin typeface="Calibri" pitchFamily="34" charset="0"/>
+              </a:rPr>
+              <a:t/>
             </a:r>
             <a:br>
               <a:rPr lang="de-DE" sz="2000" dirty="0" smtClean="0">
@@ -6418,7 +6436,7 @@
         </p:nvSpPr>
         <p:spPr>
           <a:xfrm>
-            <a:off x="250825" y="3564012"/>
+            <a:off x="250825" y="3809940"/>
             <a:ext cx="4896544" cy="400110"/>
           </a:xfrm>
           <a:prstGeom prst="rect">
@@ -6452,8 +6470,8 @@
         </p:nvSpPr>
         <p:spPr>
           <a:xfrm>
-            <a:off x="250825" y="4005064"/>
-            <a:ext cx="5905351" cy="1862048"/>
+            <a:off x="250825" y="4250992"/>
+            <a:ext cx="6625431" cy="1554272"/>
           </a:xfrm>
           <a:prstGeom prst="rect">
             <a:avLst/>
@@ -6547,9 +6565,6 @@
                     <p:cTn id="3" fill="hold">
                       <p:stCondLst>
                         <p:cond delay="indefinite"/>
-                        <p:cond evt="onBegin" delay="0">
-                          <p:tn val="2"/>
-                        </p:cond>
                       </p:stCondLst>
                       <p:childTnLst>
                         <p:par>
@@ -6559,7 +6574,7 @@
                             </p:stCondLst>
                             <p:childTnLst>
                               <p:par>
-                                <p:cTn id="5" presetID="9" presetClass="entr" presetSubtype="0" fill="hold" grpId="0" nodeType="withEffect">
+                                <p:cTn id="5" presetID="22" presetClass="entr" presetSubtype="1" fill="hold" grpId="0" nodeType="clickEffect">
                                   <p:stCondLst>
                                     <p:cond delay="0"/>
                                   </p:stCondLst>
@@ -6582,7 +6597,7 @@
                                         <p:strVal val="visible"/>
                                       </p:to>
                                     </p:set>
-                                    <p:animEffect transition="in" filter="dissolve">
+                                    <p:animEffect transition="in" filter="wipe(up)">
                                       <p:cBhvr>
                                         <p:cTn id="7" dur="500"/>
                                         <p:tgtEl>
@@ -6593,15 +6608,86 @@
                                   </p:childTnLst>
                                 </p:cTn>
                               </p:par>
+                            </p:childTnLst>
+                          </p:cTn>
+                        </p:par>
+                      </p:childTnLst>
+                    </p:cTn>
+                  </p:par>
+                  <p:par>
+                    <p:cTn id="8" fill="hold">
+                      <p:stCondLst>
+                        <p:cond delay="indefinite"/>
+                      </p:stCondLst>
+                      <p:childTnLst>
+                        <p:par>
+                          <p:cTn id="9" fill="hold">
+                            <p:stCondLst>
+                              <p:cond delay="0"/>
+                            </p:stCondLst>
+                            <p:childTnLst>
                               <p:par>
-                                <p:cTn id="8" presetID="9" presetClass="entr" presetSubtype="0" fill="hold" grpId="0" nodeType="withEffect">
+                                <p:cTn id="10" presetID="22" presetClass="entr" presetSubtype="8" fill="hold" grpId="0" nodeType="clickEffect">
                                   <p:stCondLst>
                                     <p:cond delay="0"/>
                                   </p:stCondLst>
                                   <p:childTnLst>
                                     <p:set>
                                       <p:cBhvr>
-                                        <p:cTn id="9" dur="1" fill="hold">
+                                        <p:cTn id="11" dur="1" fill="hold">
+                                          <p:stCondLst>
+                                            <p:cond delay="0"/>
+                                          </p:stCondLst>
+                                        </p:cTn>
+                                        <p:tgtEl>
+                                          <p:spTgt spid="25"/>
+                                        </p:tgtEl>
+                                        <p:attrNameLst>
+                                          <p:attrName>style.visibility</p:attrName>
+                                        </p:attrNameLst>
+                                      </p:cBhvr>
+                                      <p:to>
+                                        <p:strVal val="visible"/>
+                                      </p:to>
+                                    </p:set>
+                                    <p:animEffect transition="in" filter="wipe(left)">
+                                      <p:cBhvr>
+                                        <p:cTn id="12" dur="500"/>
+                                        <p:tgtEl>
+                                          <p:spTgt spid="25"/>
+                                        </p:tgtEl>
+                                      </p:cBhvr>
+                                    </p:animEffect>
+                                  </p:childTnLst>
+                                </p:cTn>
+                              </p:par>
+                            </p:childTnLst>
+                          </p:cTn>
+                        </p:par>
+                      </p:childTnLst>
+                    </p:cTn>
+                  </p:par>
+                  <p:par>
+                    <p:cTn id="13" fill="hold">
+                      <p:stCondLst>
+                        <p:cond delay="indefinite"/>
+                      </p:stCondLst>
+                      <p:childTnLst>
+                        <p:par>
+                          <p:cTn id="14" fill="hold">
+                            <p:stCondLst>
+                              <p:cond delay="0"/>
+                            </p:stCondLst>
+                            <p:childTnLst>
+                              <p:par>
+                                <p:cTn id="15" presetID="22" presetClass="entr" presetSubtype="1" fill="hold" grpId="0" nodeType="clickEffect">
+                                  <p:stCondLst>
+                                    <p:cond delay="0"/>
+                                  </p:stCondLst>
+                                  <p:childTnLst>
+                                    <p:set>
+                                      <p:cBhvr>
+                                        <p:cTn id="16" dur="1" fill="hold">
                                           <p:stCondLst>
                                             <p:cond delay="0"/>
                                           </p:stCondLst>
@@ -6617,9 +6703,9 @@
                                         <p:strVal val="visible"/>
                                       </p:to>
                                     </p:set>
-                                    <p:animEffect transition="in" filter="dissolve">
+                                    <p:animEffect transition="in" filter="wipe(up)">
                                       <p:cBhvr>
-                                        <p:cTn id="10" dur="500"/>
+                                        <p:cTn id="17" dur="500"/>
                                         <p:tgtEl>
                                           <p:spTgt spid="26"/>
                                         </p:tgtEl>
@@ -6657,6 +6743,7 @@
     </p:tnLst>
     <p:bldLst>
       <p:bldP spid="23" grpId="0"/>
+      <p:bldP spid="25" grpId="0"/>
       <p:bldP spid="26" grpId="0"/>
     </p:bldLst>
   </p:timing>
@@ -10681,7 +10768,7 @@
                 </a:solidFill>
                 <a:latin typeface="Calibri" pitchFamily="34" charset="0"/>
               </a:rPr>
-              <a:t>Kalibrierung und Validierung</a:t>
+              <a:t>Modelldiagnose</a:t>
             </a:r>
           </a:p>
         </p:txBody>
@@ -10712,7 +10799,7 @@
               <a:rPr lang="de-DE" sz="2800" dirty="0" smtClean="0">
                 <a:latin typeface="Calibri" pitchFamily="34" charset="0"/>
               </a:rPr>
-              <a:t>Modellkalibrierung </a:t>
+              <a:t>Was ist ein „besseres“ Modell? </a:t>
             </a:r>
             <a:endParaRPr lang="de-DE" sz="2800" dirty="0">
               <a:latin typeface="Calibri" pitchFamily="34" charset="0"/>
@@ -10722,14 +10809,494 @@
       </p:sp>
       <p:sp>
         <p:nvSpPr>
-          <p:cNvPr id="23" name="Textfeld 22"/>
+          <p:cNvPr id="28" name="Rechteck 27"/>
+          <p:cNvSpPr/>
+          <p:nvPr/>
+        </p:nvSpPr>
+        <p:spPr bwMode="auto">
+          <a:xfrm>
+            <a:off x="755575" y="1988840"/>
+            <a:ext cx="7920881" cy="3600400"/>
+          </a:xfrm>
+          <a:prstGeom prst="rect">
+            <a:avLst/>
+          </a:prstGeom>
+          <a:noFill/>
+          <a:ln w="19050" cap="flat" cmpd="sng" algn="ctr">
+            <a:solidFill>
+              <a:schemeClr val="tx1">
+                <a:lumMod val="50000"/>
+                <a:lumOff val="50000"/>
+              </a:schemeClr>
+            </a:solidFill>
+            <a:prstDash val="solid"/>
+            <a:round/>
+            <a:headEnd type="none" w="med" len="med"/>
+            <a:tailEnd type="none" w="med" len="med"/>
+          </a:ln>
+          <a:effectLst/>
+        </p:spPr>
+        <p:txBody>
+          <a:bodyPr vert="horz" wrap="square" lIns="91440" tIns="45720" rIns="91440" bIns="45720" numCol="1" rtlCol="0" anchor="t" anchorCtr="0" compatLnSpc="1">
+            <a:prstTxWarp prst="textNoShape">
+              <a:avLst/>
+            </a:prstTxWarp>
+          </a:bodyPr>
+          <a:lstStyle/>
+          <a:p>
+            <a:pPr marL="0" marR="0" indent="0" algn="l" defTabSz="914400" rtl="0" eaLnBrk="1" fontAlgn="base" latinLnBrk="0" hangingPunct="1">
+              <a:lnSpc>
+                <a:spcPct val="100000"/>
+              </a:lnSpc>
+              <a:spcBef>
+                <a:spcPct val="0"/>
+              </a:spcBef>
+              <a:spcAft>
+                <a:spcPct val="0"/>
+              </a:spcAft>
+              <a:buClrTx/>
+              <a:buSzTx/>
+              <a:buFontTx/>
+              <a:buNone/>
+              <a:tabLst/>
+            </a:pPr>
+            <a:endParaRPr kumimoji="0" lang="de-DE" sz="1600" b="0" i="0" u="none" strike="noStrike" cap="none" normalizeH="0" baseline="0" smtClean="0">
+              <a:ln>
+                <a:noFill/>
+              </a:ln>
+              <a:solidFill>
+                <a:schemeClr val="tx1"/>
+              </a:solidFill>
+              <a:effectLst/>
+              <a:latin typeface="Arial" charset="0"/>
+            </a:endParaRPr>
+          </a:p>
+        </p:txBody>
+      </p:sp>
+      <p:sp>
+        <p:nvSpPr>
+          <p:cNvPr id="39" name="Freihandform 38"/>
+          <p:cNvSpPr/>
+          <p:nvPr/>
+        </p:nvSpPr>
+        <p:spPr bwMode="auto">
+          <a:xfrm>
+            <a:off x="812800" y="2364399"/>
+            <a:ext cx="7835900" cy="3043767"/>
+          </a:xfrm>
+          <a:custGeom>
+            <a:avLst/>
+            <a:gdLst>
+              <a:gd name="connsiteX0" fmla="*/ 0 w 7835900"/>
+              <a:gd name="connsiteY0" fmla="*/ 2732617 h 3043767"/>
+              <a:gd name="connsiteX1" fmla="*/ 787400 w 7835900"/>
+              <a:gd name="connsiteY1" fmla="*/ 2872317 h 3043767"/>
+              <a:gd name="connsiteX2" fmla="*/ 1524000 w 7835900"/>
+              <a:gd name="connsiteY2" fmla="*/ 2440517 h 3043767"/>
+              <a:gd name="connsiteX3" fmla="*/ 2120900 w 7835900"/>
+              <a:gd name="connsiteY3" fmla="*/ 154517 h 3043767"/>
+              <a:gd name="connsiteX4" fmla="*/ 2616200 w 7835900"/>
+              <a:gd name="connsiteY4" fmla="*/ 1513417 h 3043767"/>
+              <a:gd name="connsiteX5" fmla="*/ 3213100 w 7835900"/>
+              <a:gd name="connsiteY5" fmla="*/ 2846917 h 3043767"/>
+              <a:gd name="connsiteX6" fmla="*/ 4864100 w 7835900"/>
+              <a:gd name="connsiteY6" fmla="*/ 2694517 h 3043767"/>
+              <a:gd name="connsiteX7" fmla="*/ 5930900 w 7835900"/>
+              <a:gd name="connsiteY7" fmla="*/ 1538817 h 3043767"/>
+              <a:gd name="connsiteX8" fmla="*/ 6781800 w 7835900"/>
+              <a:gd name="connsiteY8" fmla="*/ 2554817 h 3043767"/>
+              <a:gd name="connsiteX9" fmla="*/ 7835900 w 7835900"/>
+              <a:gd name="connsiteY9" fmla="*/ 3012017 h 3043767"/>
+              <a:gd name="connsiteX0" fmla="*/ 0 w 7835900"/>
+              <a:gd name="connsiteY0" fmla="*/ 2732617 h 3043767"/>
+              <a:gd name="connsiteX1" fmla="*/ 787400 w 7835900"/>
+              <a:gd name="connsiteY1" fmla="*/ 2872317 h 3043767"/>
+              <a:gd name="connsiteX2" fmla="*/ 1524000 w 7835900"/>
+              <a:gd name="connsiteY2" fmla="*/ 2440517 h 3043767"/>
+              <a:gd name="connsiteX3" fmla="*/ 2120900 w 7835900"/>
+              <a:gd name="connsiteY3" fmla="*/ 154517 h 3043767"/>
+              <a:gd name="connsiteX4" fmla="*/ 2616200 w 7835900"/>
+              <a:gd name="connsiteY4" fmla="*/ 1513417 h 3043767"/>
+              <a:gd name="connsiteX5" fmla="*/ 3213100 w 7835900"/>
+              <a:gd name="connsiteY5" fmla="*/ 2846917 h 3043767"/>
+              <a:gd name="connsiteX6" fmla="*/ 4864100 w 7835900"/>
+              <a:gd name="connsiteY6" fmla="*/ 2694517 h 3043767"/>
+              <a:gd name="connsiteX7" fmla="*/ 5930900 w 7835900"/>
+              <a:gd name="connsiteY7" fmla="*/ 1538817 h 3043767"/>
+              <a:gd name="connsiteX8" fmla="*/ 6781800 w 7835900"/>
+              <a:gd name="connsiteY8" fmla="*/ 2554817 h 3043767"/>
+              <a:gd name="connsiteX9" fmla="*/ 7835900 w 7835900"/>
+              <a:gd name="connsiteY9" fmla="*/ 3012017 h 3043767"/>
+              <a:gd name="connsiteX0" fmla="*/ 0 w 7835900"/>
+              <a:gd name="connsiteY0" fmla="*/ 2732617 h 3043767"/>
+              <a:gd name="connsiteX1" fmla="*/ 787400 w 7835900"/>
+              <a:gd name="connsiteY1" fmla="*/ 2872317 h 3043767"/>
+              <a:gd name="connsiteX2" fmla="*/ 1524000 w 7835900"/>
+              <a:gd name="connsiteY2" fmla="*/ 2440517 h 3043767"/>
+              <a:gd name="connsiteX3" fmla="*/ 2120900 w 7835900"/>
+              <a:gd name="connsiteY3" fmla="*/ 154517 h 3043767"/>
+              <a:gd name="connsiteX4" fmla="*/ 2616200 w 7835900"/>
+              <a:gd name="connsiteY4" fmla="*/ 1513417 h 3043767"/>
+              <a:gd name="connsiteX5" fmla="*/ 3213100 w 7835900"/>
+              <a:gd name="connsiteY5" fmla="*/ 2846917 h 3043767"/>
+              <a:gd name="connsiteX6" fmla="*/ 4864100 w 7835900"/>
+              <a:gd name="connsiteY6" fmla="*/ 2694517 h 3043767"/>
+              <a:gd name="connsiteX7" fmla="*/ 5930900 w 7835900"/>
+              <a:gd name="connsiteY7" fmla="*/ 1538817 h 3043767"/>
+              <a:gd name="connsiteX8" fmla="*/ 6781800 w 7835900"/>
+              <a:gd name="connsiteY8" fmla="*/ 2554817 h 3043767"/>
+              <a:gd name="connsiteX9" fmla="*/ 7835900 w 7835900"/>
+              <a:gd name="connsiteY9" fmla="*/ 3012017 h 3043767"/>
+            </a:gdLst>
+            <a:ahLst/>
+            <a:cxnLst>
+              <a:cxn ang="0">
+                <a:pos x="connsiteX0" y="connsiteY0"/>
+              </a:cxn>
+              <a:cxn ang="0">
+                <a:pos x="connsiteX1" y="connsiteY1"/>
+              </a:cxn>
+              <a:cxn ang="0">
+                <a:pos x="connsiteX2" y="connsiteY2"/>
+              </a:cxn>
+              <a:cxn ang="0">
+                <a:pos x="connsiteX3" y="connsiteY3"/>
+              </a:cxn>
+              <a:cxn ang="0">
+                <a:pos x="connsiteX4" y="connsiteY4"/>
+              </a:cxn>
+              <a:cxn ang="0">
+                <a:pos x="connsiteX5" y="connsiteY5"/>
+              </a:cxn>
+              <a:cxn ang="0">
+                <a:pos x="connsiteX6" y="connsiteY6"/>
+              </a:cxn>
+              <a:cxn ang="0">
+                <a:pos x="connsiteX7" y="connsiteY7"/>
+              </a:cxn>
+              <a:cxn ang="0">
+                <a:pos x="connsiteX8" y="connsiteY8"/>
+              </a:cxn>
+              <a:cxn ang="0">
+                <a:pos x="connsiteX9" y="connsiteY9"/>
+              </a:cxn>
+            </a:cxnLst>
+            <a:rect l="l" t="t" r="r" b="b"/>
+            <a:pathLst>
+              <a:path w="7835900" h="3043767">
+                <a:moveTo>
+                  <a:pt x="0" y="2732617"/>
+                </a:moveTo>
+                <a:cubicBezTo>
+                  <a:pt x="266700" y="2826808"/>
+                  <a:pt x="533400" y="2921000"/>
+                  <a:pt x="787400" y="2872317"/>
+                </a:cubicBezTo>
+                <a:cubicBezTo>
+                  <a:pt x="1041400" y="2823634"/>
+                  <a:pt x="1301750" y="2893484"/>
+                  <a:pt x="1524000" y="2440517"/>
+                </a:cubicBezTo>
+                <a:cubicBezTo>
+                  <a:pt x="1746250" y="1987550"/>
+                  <a:pt x="1938867" y="309034"/>
+                  <a:pt x="2120900" y="154517"/>
+                </a:cubicBezTo>
+                <a:cubicBezTo>
+                  <a:pt x="2302933" y="0"/>
+                  <a:pt x="2519619" y="1043600"/>
+                  <a:pt x="2616200" y="1513417"/>
+                </a:cubicBezTo>
+                <a:cubicBezTo>
+                  <a:pt x="2714145" y="1898650"/>
+                  <a:pt x="2838450" y="2650067"/>
+                  <a:pt x="3213100" y="2846917"/>
+                </a:cubicBezTo>
+                <a:cubicBezTo>
+                  <a:pt x="3587750" y="3043767"/>
+                  <a:pt x="4411133" y="2912534"/>
+                  <a:pt x="4864100" y="2694517"/>
+                </a:cubicBezTo>
+                <a:cubicBezTo>
+                  <a:pt x="5317067" y="2476500"/>
+                  <a:pt x="5611283" y="1562100"/>
+                  <a:pt x="5930900" y="1538817"/>
+                </a:cubicBezTo>
+                <a:cubicBezTo>
+                  <a:pt x="6250517" y="1515534"/>
+                  <a:pt x="6464300" y="2309284"/>
+                  <a:pt x="6781800" y="2554817"/>
+                </a:cubicBezTo>
+                <a:cubicBezTo>
+                  <a:pt x="7099300" y="2800350"/>
+                  <a:pt x="7467600" y="2906183"/>
+                  <a:pt x="7835900" y="3012017"/>
+                </a:cubicBezTo>
+              </a:path>
+            </a:pathLst>
+          </a:custGeom>
+          <a:noFill/>
+          <a:ln w="38100" cap="flat" cmpd="sng" algn="ctr">
+            <a:solidFill>
+              <a:schemeClr val="tx1"/>
+            </a:solidFill>
+            <a:prstDash val="solid"/>
+            <a:round/>
+            <a:headEnd type="none" w="med" len="med"/>
+            <a:tailEnd type="none" w="med" len="med"/>
+          </a:ln>
+          <a:effectLst/>
+        </p:spPr>
+        <p:txBody>
+          <a:bodyPr vert="horz" wrap="square" lIns="91440" tIns="45720" rIns="91440" bIns="45720" numCol="1" rtlCol="0" anchor="t" anchorCtr="0" compatLnSpc="1">
+            <a:prstTxWarp prst="textNoShape">
+              <a:avLst/>
+            </a:prstTxWarp>
+          </a:bodyPr>
+          <a:lstStyle/>
+          <a:p>
+            <a:pPr marL="0" marR="0" indent="0" algn="l" defTabSz="914400" rtl="0" eaLnBrk="1" fontAlgn="base" latinLnBrk="0" hangingPunct="1">
+              <a:lnSpc>
+                <a:spcPct val="100000"/>
+              </a:lnSpc>
+              <a:spcBef>
+                <a:spcPct val="0"/>
+              </a:spcBef>
+              <a:spcAft>
+                <a:spcPct val="0"/>
+              </a:spcAft>
+              <a:buClrTx/>
+              <a:buSzTx/>
+              <a:buFontTx/>
+              <a:buNone/>
+              <a:tabLst/>
+            </a:pPr>
+            <a:endParaRPr kumimoji="0" lang="de-DE" sz="1600" b="0" i="0" u="none" strike="noStrike" cap="none" normalizeH="0" baseline="0" smtClean="0">
+              <a:ln>
+                <a:noFill/>
+              </a:ln>
+              <a:solidFill>
+                <a:schemeClr val="tx1"/>
+              </a:solidFill>
+              <a:effectLst/>
+              <a:latin typeface="Arial" charset="0"/>
+            </a:endParaRPr>
+          </a:p>
+        </p:txBody>
+      </p:sp>
+      <p:sp>
+        <p:nvSpPr>
+          <p:cNvPr id="47" name="Freihandform 46"/>
+          <p:cNvSpPr/>
+          <p:nvPr/>
+        </p:nvSpPr>
+        <p:spPr bwMode="auto">
+          <a:xfrm>
+            <a:off x="683683" y="3001516"/>
+            <a:ext cx="7977717" cy="2533117"/>
+          </a:xfrm>
+          <a:custGeom>
+            <a:avLst/>
+            <a:gdLst>
+              <a:gd name="connsiteX0" fmla="*/ 154517 w 7977717"/>
+              <a:gd name="connsiteY0" fmla="*/ 1917700 h 2506133"/>
+              <a:gd name="connsiteX1" fmla="*/ 205317 w 7977717"/>
+              <a:gd name="connsiteY1" fmla="*/ 1943100 h 2506133"/>
+              <a:gd name="connsiteX2" fmla="*/ 1386417 w 7977717"/>
+              <a:gd name="connsiteY2" fmla="*/ 2222500 h 2506133"/>
+              <a:gd name="connsiteX3" fmla="*/ 2110317 w 7977717"/>
+              <a:gd name="connsiteY3" fmla="*/ 914400 h 2506133"/>
+              <a:gd name="connsiteX4" fmla="*/ 2834217 w 7977717"/>
+              <a:gd name="connsiteY4" fmla="*/ 1866900 h 2506133"/>
+              <a:gd name="connsiteX5" fmla="*/ 3735917 w 7977717"/>
+              <a:gd name="connsiteY5" fmla="*/ 2209800 h 2506133"/>
+              <a:gd name="connsiteX6" fmla="*/ 4955117 w 7977717"/>
+              <a:gd name="connsiteY6" fmla="*/ 2159000 h 2506133"/>
+              <a:gd name="connsiteX7" fmla="*/ 5742517 w 7977717"/>
+              <a:gd name="connsiteY7" fmla="*/ 127000 h 2506133"/>
+              <a:gd name="connsiteX8" fmla="*/ 6199717 w 7977717"/>
+              <a:gd name="connsiteY8" fmla="*/ 1397000 h 2506133"/>
+              <a:gd name="connsiteX9" fmla="*/ 6898217 w 7977717"/>
+              <a:gd name="connsiteY9" fmla="*/ 2133600 h 2506133"/>
+              <a:gd name="connsiteX10" fmla="*/ 7977717 w 7977717"/>
+              <a:gd name="connsiteY10" fmla="*/ 2501900 h 2506133"/>
+              <a:gd name="connsiteX0" fmla="*/ 154517 w 7977717"/>
+              <a:gd name="connsiteY0" fmla="*/ 1917700 h 2533117"/>
+              <a:gd name="connsiteX1" fmla="*/ 205317 w 7977717"/>
+              <a:gd name="connsiteY1" fmla="*/ 1943100 h 2533117"/>
+              <a:gd name="connsiteX2" fmla="*/ 1386417 w 7977717"/>
+              <a:gd name="connsiteY2" fmla="*/ 2222500 h 2533117"/>
+              <a:gd name="connsiteX3" fmla="*/ 2110317 w 7977717"/>
+              <a:gd name="connsiteY3" fmla="*/ 914400 h 2533117"/>
+              <a:gd name="connsiteX4" fmla="*/ 2834217 w 7977717"/>
+              <a:gd name="connsiteY4" fmla="*/ 1866900 h 2533117"/>
+              <a:gd name="connsiteX5" fmla="*/ 3743855 w 7977717"/>
+              <a:gd name="connsiteY5" fmla="*/ 2371700 h 2533117"/>
+              <a:gd name="connsiteX6" fmla="*/ 4955117 w 7977717"/>
+              <a:gd name="connsiteY6" fmla="*/ 2159000 h 2533117"/>
+              <a:gd name="connsiteX7" fmla="*/ 5742517 w 7977717"/>
+              <a:gd name="connsiteY7" fmla="*/ 127000 h 2533117"/>
+              <a:gd name="connsiteX8" fmla="*/ 6199717 w 7977717"/>
+              <a:gd name="connsiteY8" fmla="*/ 1397000 h 2533117"/>
+              <a:gd name="connsiteX9" fmla="*/ 6898217 w 7977717"/>
+              <a:gd name="connsiteY9" fmla="*/ 2133600 h 2533117"/>
+              <a:gd name="connsiteX10" fmla="*/ 7977717 w 7977717"/>
+              <a:gd name="connsiteY10" fmla="*/ 2501900 h 2533117"/>
+            </a:gdLst>
+            <a:ahLst/>
+            <a:cxnLst>
+              <a:cxn ang="0">
+                <a:pos x="connsiteX0" y="connsiteY0"/>
+              </a:cxn>
+              <a:cxn ang="0">
+                <a:pos x="connsiteX1" y="connsiteY1"/>
+              </a:cxn>
+              <a:cxn ang="0">
+                <a:pos x="connsiteX2" y="connsiteY2"/>
+              </a:cxn>
+              <a:cxn ang="0">
+                <a:pos x="connsiteX3" y="connsiteY3"/>
+              </a:cxn>
+              <a:cxn ang="0">
+                <a:pos x="connsiteX4" y="connsiteY4"/>
+              </a:cxn>
+              <a:cxn ang="0">
+                <a:pos x="connsiteX5" y="connsiteY5"/>
+              </a:cxn>
+              <a:cxn ang="0">
+                <a:pos x="connsiteX6" y="connsiteY6"/>
+              </a:cxn>
+              <a:cxn ang="0">
+                <a:pos x="connsiteX7" y="connsiteY7"/>
+              </a:cxn>
+              <a:cxn ang="0">
+                <a:pos x="connsiteX8" y="connsiteY8"/>
+              </a:cxn>
+              <a:cxn ang="0">
+                <a:pos x="connsiteX9" y="connsiteY9"/>
+              </a:cxn>
+              <a:cxn ang="0">
+                <a:pos x="connsiteX10" y="connsiteY10"/>
+              </a:cxn>
+            </a:cxnLst>
+            <a:rect l="l" t="t" r="r" b="b"/>
+            <a:pathLst>
+              <a:path w="7977717" h="2533117">
+                <a:moveTo>
+                  <a:pt x="154517" y="1917700"/>
+                </a:moveTo>
+                <a:cubicBezTo>
+                  <a:pt x="77258" y="1905000"/>
+                  <a:pt x="0" y="1892300"/>
+                  <a:pt x="205317" y="1943100"/>
+                </a:cubicBezTo>
+                <a:cubicBezTo>
+                  <a:pt x="410634" y="1993900"/>
+                  <a:pt x="1068917" y="2393950"/>
+                  <a:pt x="1386417" y="2222500"/>
+                </a:cubicBezTo>
+                <a:cubicBezTo>
+                  <a:pt x="1703917" y="2051050"/>
+                  <a:pt x="1869017" y="973667"/>
+                  <a:pt x="2110317" y="914400"/>
+                </a:cubicBezTo>
+                <a:cubicBezTo>
+                  <a:pt x="2351617" y="855133"/>
+                  <a:pt x="2561961" y="1624017"/>
+                  <a:pt x="2834217" y="1866900"/>
+                </a:cubicBezTo>
+                <a:cubicBezTo>
+                  <a:pt x="3106473" y="2109783"/>
+                  <a:pt x="3390372" y="2323017"/>
+                  <a:pt x="3743855" y="2371700"/>
+                </a:cubicBezTo>
+                <a:cubicBezTo>
+                  <a:pt x="4097338" y="2420383"/>
+                  <a:pt x="4622007" y="2533117"/>
+                  <a:pt x="4955117" y="2159000"/>
+                </a:cubicBezTo>
+                <a:cubicBezTo>
+                  <a:pt x="5288227" y="1784883"/>
+                  <a:pt x="5535084" y="254000"/>
+                  <a:pt x="5742517" y="127000"/>
+                </a:cubicBezTo>
+                <a:cubicBezTo>
+                  <a:pt x="5949950" y="0"/>
+                  <a:pt x="6007100" y="1062567"/>
+                  <a:pt x="6199717" y="1397000"/>
+                </a:cubicBezTo>
+                <a:cubicBezTo>
+                  <a:pt x="6392334" y="1731433"/>
+                  <a:pt x="6601884" y="1949450"/>
+                  <a:pt x="6898217" y="2133600"/>
+                </a:cubicBezTo>
+                <a:cubicBezTo>
+                  <a:pt x="7194550" y="2317750"/>
+                  <a:pt x="7586133" y="2409825"/>
+                  <a:pt x="7977717" y="2501900"/>
+                </a:cubicBezTo>
+              </a:path>
+            </a:pathLst>
+          </a:custGeom>
+          <a:noFill/>
+          <a:ln w="19050" cap="flat" cmpd="sng" algn="ctr">
+            <a:solidFill>
+              <a:srgbClr val="C00000"/>
+            </a:solidFill>
+            <a:prstDash val="sysDash"/>
+            <a:round/>
+            <a:headEnd type="none" w="med" len="med"/>
+            <a:tailEnd type="none" w="med" len="med"/>
+          </a:ln>
+          <a:effectLst/>
+        </p:spPr>
+        <p:txBody>
+          <a:bodyPr vert="horz" wrap="square" lIns="91440" tIns="45720" rIns="91440" bIns="45720" numCol="1" rtlCol="0" anchor="t" anchorCtr="0" compatLnSpc="1">
+            <a:prstTxWarp prst="textNoShape">
+              <a:avLst/>
+            </a:prstTxWarp>
+          </a:bodyPr>
+          <a:lstStyle/>
+          <a:p>
+            <a:pPr marL="0" marR="0" indent="0" algn="l" defTabSz="914400" rtl="0" eaLnBrk="1" fontAlgn="base" latinLnBrk="0" hangingPunct="1">
+              <a:lnSpc>
+                <a:spcPct val="100000"/>
+              </a:lnSpc>
+              <a:spcBef>
+                <a:spcPct val="0"/>
+              </a:spcBef>
+              <a:spcAft>
+                <a:spcPct val="0"/>
+              </a:spcAft>
+              <a:buClrTx/>
+              <a:buSzTx/>
+              <a:buFontTx/>
+              <a:buNone/>
+              <a:tabLst/>
+            </a:pPr>
+            <a:endParaRPr kumimoji="0" lang="de-DE" sz="1600" b="0" i="0" u="none" strike="noStrike" cap="none" normalizeH="0" baseline="0" smtClean="0">
+              <a:ln>
+                <a:noFill/>
+              </a:ln>
+              <a:solidFill>
+                <a:schemeClr val="tx1"/>
+              </a:solidFill>
+              <a:effectLst/>
+              <a:latin typeface="Arial" charset="0"/>
+            </a:endParaRPr>
+          </a:p>
+        </p:txBody>
+      </p:sp>
+      <p:sp>
+        <p:nvSpPr>
+          <p:cNvPr id="54" name="Textfeld 53"/>
           <p:cNvSpPr txBox="1"/>
           <p:nvPr/>
         </p:nvSpPr>
         <p:spPr>
           <a:xfrm>
-            <a:off x="250825" y="1484784"/>
-            <a:ext cx="6049367" cy="400110"/>
+            <a:off x="251520" y="1556792"/>
+            <a:ext cx="1547664" cy="461665"/>
           </a:xfrm>
           <a:prstGeom prst="rect">
             <a:avLst/>
@@ -10742,30 +11309,28 @@
           </a:bodyPr>
           <a:lstStyle/>
           <a:p>
-            <a:pPr>
-              <a:spcAft>
-                <a:spcPts val="600"/>
-              </a:spcAft>
-            </a:pPr>
-            <a:r>
-              <a:rPr lang="de-DE" sz="2000" b="1" dirty="0" smtClean="0">
+            <a:r>
+              <a:rPr lang="de-DE" sz="2400" dirty="0" smtClean="0">
                 <a:latin typeface="Calibri" pitchFamily="34" charset="0"/>
               </a:rPr>
-              <a:t>Parameter des abcd-Modells sind alle „konzeptionell“:</a:t>
-            </a:r>
+              <a:t>Abfluss</a:t>
+            </a:r>
+            <a:endParaRPr lang="de-DE" sz="2400" dirty="0">
+              <a:latin typeface="Calibri" pitchFamily="34" charset="0"/>
+            </a:endParaRPr>
           </a:p>
         </p:txBody>
       </p:sp>
       <p:sp>
         <p:nvSpPr>
-          <p:cNvPr id="29" name="Textfeld 28"/>
+          <p:cNvPr id="55" name="Textfeld 54"/>
           <p:cNvSpPr txBox="1"/>
           <p:nvPr/>
         </p:nvSpPr>
         <p:spPr>
           <a:xfrm>
-            <a:off x="250825" y="1916833"/>
-            <a:ext cx="6265391" cy="784830"/>
+            <a:off x="7200800" y="5693186"/>
+            <a:ext cx="1547664" cy="461665"/>
           </a:xfrm>
           <a:prstGeom prst="rect">
             <a:avLst/>
@@ -10778,147 +11343,29 @@
           </a:bodyPr>
           <a:lstStyle/>
           <a:p>
-            <a:pPr marL="273050" indent="-273050">
-              <a:spcAft>
-                <a:spcPts val="600"/>
-              </a:spcAft>
-              <a:buFont typeface="Wingdings" pitchFamily="2" charset="2"/>
-              <a:buChar char="§"/>
-              <a:tabLst>
-                <a:tab pos="273050" algn="l"/>
-              </a:tabLst>
-            </a:pPr>
-            <a:r>
-              <a:rPr lang="de-DE" sz="2000" dirty="0" smtClean="0">
+            <a:pPr algn="r"/>
+            <a:r>
+              <a:rPr lang="de-DE" sz="2400" dirty="0" smtClean="0">
                 <a:latin typeface="Calibri" pitchFamily="34" charset="0"/>
               </a:rPr>
-              <a:t>Physikalisch interpretierbar, aber nicht messbar</a:t>
-            </a:r>
-          </a:p>
-          <a:p>
-            <a:pPr marL="273050" indent="-273050">
-              <a:spcAft>
-                <a:spcPts val="600"/>
-              </a:spcAft>
-              <a:buFont typeface="Wingdings" pitchFamily="2" charset="2"/>
-              <a:buChar char="§"/>
-              <a:tabLst>
-                <a:tab pos="273050" algn="l"/>
-              </a:tabLst>
-            </a:pPr>
-            <a:r>
-              <a:rPr lang="de-DE" sz="2000" dirty="0" smtClean="0">
-                <a:latin typeface="Calibri" pitchFamily="34" charset="0"/>
-              </a:rPr>
-              <a:t>Wie kann ich dann aber die Parameterwerte wählen?</a:t>
-            </a:r>
+              <a:t>Zeit</a:t>
+            </a:r>
+            <a:endParaRPr lang="de-DE" sz="2400" dirty="0">
+              <a:latin typeface="Calibri" pitchFamily="34" charset="0"/>
+            </a:endParaRPr>
           </a:p>
         </p:txBody>
       </p:sp>
       <p:sp>
         <p:nvSpPr>
-          <p:cNvPr id="28" name="Textfeld 27"/>
+          <p:cNvPr id="56" name="Textfeld 55"/>
           <p:cNvSpPr txBox="1"/>
           <p:nvPr/>
         </p:nvSpPr>
         <p:spPr>
           <a:xfrm>
-            <a:off x="0" y="2874144"/>
-            <a:ext cx="9144000" cy="1015663"/>
-          </a:xfrm>
-          <a:prstGeom prst="rect">
-            <a:avLst/>
-          </a:prstGeom>
-          <a:solidFill>
-            <a:srgbClr val="2B5681"/>
-          </a:solidFill>
-        </p:spPr>
-        <p:txBody>
-          <a:bodyPr wrap="square" rtlCol="0">
-            <a:spAutoFit/>
-          </a:bodyPr>
-          <a:lstStyle/>
-          <a:p>
-            <a:pPr algn="ctr">
-              <a:spcAft>
-                <a:spcPts val="600"/>
-              </a:spcAft>
-            </a:pPr>
-            <a:r>
-              <a:rPr lang="de-DE" sz="2000" dirty="0" smtClean="0">
-                <a:solidFill>
-                  <a:schemeClr val="bg1"/>
-                </a:solidFill>
-                <a:latin typeface="Calibri" pitchFamily="34" charset="0"/>
-              </a:rPr>
-              <a:t>Suche eine Kombination von Parametern (</a:t>
-            </a:r>
-            <a:r>
-              <a:rPr lang="de-DE" sz="2000" dirty="0" smtClean="0">
-                <a:solidFill>
-                  <a:schemeClr val="bg1"/>
-                </a:solidFill>
-                <a:latin typeface="Courier New" pitchFamily="49" charset="0"/>
-                <a:cs typeface="Courier New" pitchFamily="49" charset="0"/>
-              </a:rPr>
-              <a:t>par</a:t>
-            </a:r>
-            <a:r>
-              <a:rPr lang="de-DE" sz="2000" dirty="0" smtClean="0">
-                <a:solidFill>
-                  <a:schemeClr val="bg1"/>
-                </a:solidFill>
-                <a:latin typeface="Calibri" pitchFamily="34" charset="0"/>
-              </a:rPr>
-              <a:t>), </a:t>
-            </a:r>
-            <a:br>
-              <a:rPr lang="de-DE" sz="2000" dirty="0" smtClean="0">
-                <a:solidFill>
-                  <a:schemeClr val="bg1"/>
-                </a:solidFill>
-                <a:latin typeface="Calibri" pitchFamily="34" charset="0"/>
-              </a:rPr>
-            </a:br>
-            <a:r>
-              <a:rPr lang="de-DE" sz="2000" dirty="0" smtClean="0">
-                <a:solidFill>
-                  <a:schemeClr val="bg1"/>
-                </a:solidFill>
-                <a:latin typeface="Calibri" pitchFamily="34" charset="0"/>
-              </a:rPr>
-              <a:t>so dass Beobachtung und Simulation </a:t>
-            </a:r>
-            <a:br>
-              <a:rPr lang="de-DE" sz="2000" dirty="0" smtClean="0">
-                <a:solidFill>
-                  <a:schemeClr val="bg1"/>
-                </a:solidFill>
-                <a:latin typeface="Calibri" pitchFamily="34" charset="0"/>
-              </a:rPr>
-            </a:br>
-            <a:r>
-              <a:rPr lang="de-DE" sz="2000" dirty="0" smtClean="0">
-                <a:solidFill>
-                  <a:schemeClr val="bg1"/>
-                </a:solidFill>
-                <a:latin typeface="Calibri" pitchFamily="34" charset="0"/>
-              </a:rPr>
-              <a:t>möglichst gut übereinstimmen.</a:t>
-            </a:r>
-          </a:p>
-        </p:txBody>
-      </p:sp>
-      <p:sp>
-        <p:nvSpPr>
-          <p:cNvPr id="39" name="Textfeld 38"/>
-          <p:cNvSpPr txBox="1"/>
-          <p:nvPr/>
-        </p:nvSpPr>
-        <p:spPr>
-          <a:xfrm>
-            <a:off x="251520" y="4026272"/>
-            <a:ext cx="8713093" cy="400110"/>
+            <a:off x="3059832" y="2276872"/>
+            <a:ext cx="2160240" cy="400110"/>
           </a:xfrm>
           <a:prstGeom prst="rect">
             <a:avLst/>
@@ -10931,53 +11378,28 @@
           </a:bodyPr>
           <a:lstStyle/>
           <a:p>
-            <a:pPr>
-              <a:spcAft>
-                <a:spcPts val="600"/>
-              </a:spcAft>
-              <a:tabLst>
-                <a:tab pos="1974850" algn="l"/>
-              </a:tabLst>
-            </a:pPr>
             <a:r>
               <a:rPr lang="de-DE" sz="2000" dirty="0" smtClean="0">
                 <a:latin typeface="Calibri" pitchFamily="34" charset="0"/>
               </a:rPr>
-              <a:t>Beobachtung	: gemessener Abfluss </a:t>
-            </a:r>
-            <a:r>
-              <a:rPr lang="de-DE" sz="2000" dirty="0" err="1" smtClean="0">
-                <a:latin typeface="Courier New" pitchFamily="49" charset="0"/>
-                <a:cs typeface="Courier New" pitchFamily="49" charset="0"/>
-              </a:rPr>
-              <a:t>Q</a:t>
-            </a:r>
-            <a:r>
-              <a:rPr lang="de-DE" sz="2000" baseline="-25000" dirty="0" err="1" smtClean="0">
-                <a:latin typeface="Courier New" pitchFamily="49" charset="0"/>
-                <a:cs typeface="Courier New" pitchFamily="49" charset="0"/>
-              </a:rPr>
-              <a:t>obs</a:t>
-            </a:r>
-            <a:r>
-              <a:rPr lang="de-DE" sz="2000" dirty="0" smtClean="0">
-                <a:latin typeface="Calibri" pitchFamily="34" charset="0"/>
-              </a:rPr>
-              <a:t> am Gebietsauslass</a:t>
-            </a:r>
+              <a:t>beobachtet</a:t>
+            </a:r>
+            <a:endParaRPr lang="de-DE" sz="2000" dirty="0">
+              <a:latin typeface="Calibri" pitchFamily="34" charset="0"/>
+            </a:endParaRPr>
           </a:p>
         </p:txBody>
       </p:sp>
       <p:sp>
         <p:nvSpPr>
-          <p:cNvPr id="47" name="Textfeld 46"/>
+          <p:cNvPr id="57" name="Textfeld 56"/>
           <p:cNvSpPr txBox="1"/>
           <p:nvPr/>
         </p:nvSpPr>
         <p:spPr>
           <a:xfrm>
-            <a:off x="251520" y="4418250"/>
-            <a:ext cx="8713093" cy="400110"/>
+            <a:off x="6444208" y="2730084"/>
+            <a:ext cx="2160240" cy="400110"/>
           </a:xfrm>
           <a:prstGeom prst="rect">
             <a:avLst/>
@@ -10990,60 +11412,371 @@
           </a:bodyPr>
           <a:lstStyle/>
           <a:p>
-            <a:pPr>
-              <a:spcAft>
-                <a:spcPts val="600"/>
-              </a:spcAft>
-              <a:tabLst>
-                <a:tab pos="1974850" algn="l"/>
-              </a:tabLst>
-            </a:pPr>
             <a:r>
               <a:rPr lang="de-DE" sz="2000" dirty="0" smtClean="0">
+                <a:solidFill>
+                  <a:srgbClr val="C00000"/>
+                </a:solidFill>
                 <a:latin typeface="Calibri" pitchFamily="34" charset="0"/>
               </a:rPr>
-              <a:t>Simulation	: simulierter Abfluss </a:t>
-            </a:r>
-            <a:r>
-              <a:rPr lang="de-DE" sz="2000" dirty="0" err="1" smtClean="0">
-                <a:latin typeface="Courier New" pitchFamily="49" charset="0"/>
-                <a:cs typeface="Courier New" pitchFamily="49" charset="0"/>
-              </a:rPr>
-              <a:t>Q</a:t>
-            </a:r>
-            <a:r>
-              <a:rPr lang="de-DE" sz="2000" baseline="-25000" dirty="0" err="1" smtClean="0">
-                <a:latin typeface="Courier New" pitchFamily="49" charset="0"/>
-                <a:cs typeface="Courier New" pitchFamily="49" charset="0"/>
-              </a:rPr>
-              <a:t>sim</a:t>
-            </a:r>
-            <a:r>
-              <a:rPr lang="de-DE" sz="2000" dirty="0" smtClean="0">
-                <a:latin typeface="Courier New" pitchFamily="49" charset="0"/>
-                <a:cs typeface="Courier New" pitchFamily="49" charset="0"/>
-              </a:rPr>
-              <a:t>(par)</a:t>
-            </a:r>
-            <a:r>
-              <a:rPr lang="de-DE" sz="2000" dirty="0" smtClean="0">
-                <a:latin typeface="Calibri" pitchFamily="34" charset="0"/>
-              </a:rPr>
-              <a:t> am Gebietsauslass</a:t>
-            </a:r>
+              <a:t>simuliert #1</a:t>
+            </a:r>
+            <a:endParaRPr lang="de-DE" sz="2000" dirty="0">
+              <a:solidFill>
+                <a:srgbClr val="C00000"/>
+              </a:solidFill>
+              <a:latin typeface="Calibri" pitchFamily="34" charset="0"/>
+            </a:endParaRPr>
           </a:p>
         </p:txBody>
       </p:sp>
       <p:sp>
         <p:nvSpPr>
-          <p:cNvPr id="54" name="Textfeld 53"/>
+          <p:cNvPr id="11" name="Freihandform 10"/>
+          <p:cNvSpPr/>
+          <p:nvPr/>
+        </p:nvSpPr>
+        <p:spPr bwMode="auto">
+          <a:xfrm>
+            <a:off x="755576" y="2780928"/>
+            <a:ext cx="7977717" cy="2689626"/>
+          </a:xfrm>
+          <a:custGeom>
+            <a:avLst/>
+            <a:gdLst>
+              <a:gd name="connsiteX0" fmla="*/ 154517 w 7977717"/>
+              <a:gd name="connsiteY0" fmla="*/ 1917700 h 2506133"/>
+              <a:gd name="connsiteX1" fmla="*/ 205317 w 7977717"/>
+              <a:gd name="connsiteY1" fmla="*/ 1943100 h 2506133"/>
+              <a:gd name="connsiteX2" fmla="*/ 1386417 w 7977717"/>
+              <a:gd name="connsiteY2" fmla="*/ 2222500 h 2506133"/>
+              <a:gd name="connsiteX3" fmla="*/ 2110317 w 7977717"/>
+              <a:gd name="connsiteY3" fmla="*/ 914400 h 2506133"/>
+              <a:gd name="connsiteX4" fmla="*/ 2834217 w 7977717"/>
+              <a:gd name="connsiteY4" fmla="*/ 1866900 h 2506133"/>
+              <a:gd name="connsiteX5" fmla="*/ 3735917 w 7977717"/>
+              <a:gd name="connsiteY5" fmla="*/ 2209800 h 2506133"/>
+              <a:gd name="connsiteX6" fmla="*/ 4955117 w 7977717"/>
+              <a:gd name="connsiteY6" fmla="*/ 2159000 h 2506133"/>
+              <a:gd name="connsiteX7" fmla="*/ 5742517 w 7977717"/>
+              <a:gd name="connsiteY7" fmla="*/ 127000 h 2506133"/>
+              <a:gd name="connsiteX8" fmla="*/ 6199717 w 7977717"/>
+              <a:gd name="connsiteY8" fmla="*/ 1397000 h 2506133"/>
+              <a:gd name="connsiteX9" fmla="*/ 6898217 w 7977717"/>
+              <a:gd name="connsiteY9" fmla="*/ 2133600 h 2506133"/>
+              <a:gd name="connsiteX10" fmla="*/ 7977717 w 7977717"/>
+              <a:gd name="connsiteY10" fmla="*/ 2501900 h 2506133"/>
+              <a:gd name="connsiteX0" fmla="*/ 154517 w 7977717"/>
+              <a:gd name="connsiteY0" fmla="*/ 1917700 h 2533117"/>
+              <a:gd name="connsiteX1" fmla="*/ 205317 w 7977717"/>
+              <a:gd name="connsiteY1" fmla="*/ 1943100 h 2533117"/>
+              <a:gd name="connsiteX2" fmla="*/ 1386417 w 7977717"/>
+              <a:gd name="connsiteY2" fmla="*/ 2222500 h 2533117"/>
+              <a:gd name="connsiteX3" fmla="*/ 2110317 w 7977717"/>
+              <a:gd name="connsiteY3" fmla="*/ 914400 h 2533117"/>
+              <a:gd name="connsiteX4" fmla="*/ 2834217 w 7977717"/>
+              <a:gd name="connsiteY4" fmla="*/ 1866900 h 2533117"/>
+              <a:gd name="connsiteX5" fmla="*/ 3743855 w 7977717"/>
+              <a:gd name="connsiteY5" fmla="*/ 2371700 h 2533117"/>
+              <a:gd name="connsiteX6" fmla="*/ 4955117 w 7977717"/>
+              <a:gd name="connsiteY6" fmla="*/ 2159000 h 2533117"/>
+              <a:gd name="connsiteX7" fmla="*/ 5742517 w 7977717"/>
+              <a:gd name="connsiteY7" fmla="*/ 127000 h 2533117"/>
+              <a:gd name="connsiteX8" fmla="*/ 6199717 w 7977717"/>
+              <a:gd name="connsiteY8" fmla="*/ 1397000 h 2533117"/>
+              <a:gd name="connsiteX9" fmla="*/ 6898217 w 7977717"/>
+              <a:gd name="connsiteY9" fmla="*/ 2133600 h 2533117"/>
+              <a:gd name="connsiteX10" fmla="*/ 7977717 w 7977717"/>
+              <a:gd name="connsiteY10" fmla="*/ 2501900 h 2533117"/>
+              <a:gd name="connsiteX0" fmla="*/ 154517 w 7977717"/>
+              <a:gd name="connsiteY0" fmla="*/ 2481023 h 3193682"/>
+              <a:gd name="connsiteX1" fmla="*/ 205317 w 7977717"/>
+              <a:gd name="connsiteY1" fmla="*/ 2506423 h 3193682"/>
+              <a:gd name="connsiteX2" fmla="*/ 1386417 w 7977717"/>
+              <a:gd name="connsiteY2" fmla="*/ 2785823 h 3193682"/>
+              <a:gd name="connsiteX3" fmla="*/ 2088232 w 7977717"/>
+              <a:gd name="connsiteY3" fmla="*/ 59267 h 3193682"/>
+              <a:gd name="connsiteX4" fmla="*/ 2834217 w 7977717"/>
+              <a:gd name="connsiteY4" fmla="*/ 2430223 h 3193682"/>
+              <a:gd name="connsiteX5" fmla="*/ 3743855 w 7977717"/>
+              <a:gd name="connsiteY5" fmla="*/ 2935023 h 3193682"/>
+              <a:gd name="connsiteX6" fmla="*/ 4955117 w 7977717"/>
+              <a:gd name="connsiteY6" fmla="*/ 2722323 h 3193682"/>
+              <a:gd name="connsiteX7" fmla="*/ 5742517 w 7977717"/>
+              <a:gd name="connsiteY7" fmla="*/ 690323 h 3193682"/>
+              <a:gd name="connsiteX8" fmla="*/ 6199717 w 7977717"/>
+              <a:gd name="connsiteY8" fmla="*/ 1960323 h 3193682"/>
+              <a:gd name="connsiteX9" fmla="*/ 6898217 w 7977717"/>
+              <a:gd name="connsiteY9" fmla="*/ 2696923 h 3193682"/>
+              <a:gd name="connsiteX10" fmla="*/ 7977717 w 7977717"/>
+              <a:gd name="connsiteY10" fmla="*/ 3065223 h 3193682"/>
+              <a:gd name="connsiteX0" fmla="*/ 154517 w 7977717"/>
+              <a:gd name="connsiteY0" fmla="*/ 2048975 h 2689626"/>
+              <a:gd name="connsiteX1" fmla="*/ 205317 w 7977717"/>
+              <a:gd name="connsiteY1" fmla="*/ 2074375 h 2689626"/>
+              <a:gd name="connsiteX2" fmla="*/ 1386417 w 7977717"/>
+              <a:gd name="connsiteY2" fmla="*/ 2353775 h 2689626"/>
+              <a:gd name="connsiteX3" fmla="*/ 2232248 w 7977717"/>
+              <a:gd name="connsiteY3" fmla="*/ 59267 h 2689626"/>
+              <a:gd name="connsiteX4" fmla="*/ 2834217 w 7977717"/>
+              <a:gd name="connsiteY4" fmla="*/ 1998175 h 2689626"/>
+              <a:gd name="connsiteX5" fmla="*/ 3743855 w 7977717"/>
+              <a:gd name="connsiteY5" fmla="*/ 2502975 h 2689626"/>
+              <a:gd name="connsiteX6" fmla="*/ 4955117 w 7977717"/>
+              <a:gd name="connsiteY6" fmla="*/ 2290275 h 2689626"/>
+              <a:gd name="connsiteX7" fmla="*/ 5742517 w 7977717"/>
+              <a:gd name="connsiteY7" fmla="*/ 258275 h 2689626"/>
+              <a:gd name="connsiteX8" fmla="*/ 6199717 w 7977717"/>
+              <a:gd name="connsiteY8" fmla="*/ 1528275 h 2689626"/>
+              <a:gd name="connsiteX9" fmla="*/ 6898217 w 7977717"/>
+              <a:gd name="connsiteY9" fmla="*/ 2264875 h 2689626"/>
+              <a:gd name="connsiteX10" fmla="*/ 7977717 w 7977717"/>
+              <a:gd name="connsiteY10" fmla="*/ 2633175 h 2689626"/>
+              <a:gd name="connsiteX0" fmla="*/ 154517 w 7977717"/>
+              <a:gd name="connsiteY0" fmla="*/ 2048975 h 2689626"/>
+              <a:gd name="connsiteX1" fmla="*/ 205317 w 7977717"/>
+              <a:gd name="connsiteY1" fmla="*/ 2074375 h 2689626"/>
+              <a:gd name="connsiteX2" fmla="*/ 1386417 w 7977717"/>
+              <a:gd name="connsiteY2" fmla="*/ 2353775 h 2689626"/>
+              <a:gd name="connsiteX3" fmla="*/ 2232248 w 7977717"/>
+              <a:gd name="connsiteY3" fmla="*/ 59267 h 2689626"/>
+              <a:gd name="connsiteX4" fmla="*/ 2834217 w 7977717"/>
+              <a:gd name="connsiteY4" fmla="*/ 1998175 h 2689626"/>
+              <a:gd name="connsiteX5" fmla="*/ 3743855 w 7977717"/>
+              <a:gd name="connsiteY5" fmla="*/ 2502975 h 2689626"/>
+              <a:gd name="connsiteX6" fmla="*/ 4955117 w 7977717"/>
+              <a:gd name="connsiteY6" fmla="*/ 2290275 h 2689626"/>
+              <a:gd name="connsiteX7" fmla="*/ 5688632 w 7977717"/>
+              <a:gd name="connsiteY7" fmla="*/ 1211395 h 2689626"/>
+              <a:gd name="connsiteX8" fmla="*/ 6199717 w 7977717"/>
+              <a:gd name="connsiteY8" fmla="*/ 1528275 h 2689626"/>
+              <a:gd name="connsiteX9" fmla="*/ 6898217 w 7977717"/>
+              <a:gd name="connsiteY9" fmla="*/ 2264875 h 2689626"/>
+              <a:gd name="connsiteX10" fmla="*/ 7977717 w 7977717"/>
+              <a:gd name="connsiteY10" fmla="*/ 2633175 h 2689626"/>
+              <a:gd name="connsiteX0" fmla="*/ 154517 w 7977717"/>
+              <a:gd name="connsiteY0" fmla="*/ 2048975 h 2689626"/>
+              <a:gd name="connsiteX1" fmla="*/ 205317 w 7977717"/>
+              <a:gd name="connsiteY1" fmla="*/ 2074375 h 2689626"/>
+              <a:gd name="connsiteX2" fmla="*/ 1386417 w 7977717"/>
+              <a:gd name="connsiteY2" fmla="*/ 2353775 h 2689626"/>
+              <a:gd name="connsiteX3" fmla="*/ 2232248 w 7977717"/>
+              <a:gd name="connsiteY3" fmla="*/ 59267 h 2689626"/>
+              <a:gd name="connsiteX4" fmla="*/ 2834217 w 7977717"/>
+              <a:gd name="connsiteY4" fmla="*/ 1998175 h 2689626"/>
+              <a:gd name="connsiteX5" fmla="*/ 3743855 w 7977717"/>
+              <a:gd name="connsiteY5" fmla="*/ 2502975 h 2689626"/>
+              <a:gd name="connsiteX6" fmla="*/ 4955117 w 7977717"/>
+              <a:gd name="connsiteY6" fmla="*/ 2290275 h 2689626"/>
+              <a:gd name="connsiteX7" fmla="*/ 5688632 w 7977717"/>
+              <a:gd name="connsiteY7" fmla="*/ 1211395 h 2689626"/>
+              <a:gd name="connsiteX8" fmla="*/ 6199717 w 7977717"/>
+              <a:gd name="connsiteY8" fmla="*/ 1528275 h 2689626"/>
+              <a:gd name="connsiteX9" fmla="*/ 6898217 w 7977717"/>
+              <a:gd name="connsiteY9" fmla="*/ 2264875 h 2689626"/>
+              <a:gd name="connsiteX10" fmla="*/ 7977717 w 7977717"/>
+              <a:gd name="connsiteY10" fmla="*/ 2633175 h 2689626"/>
+              <a:gd name="connsiteX0" fmla="*/ 154517 w 7977717"/>
+              <a:gd name="connsiteY0" fmla="*/ 2048975 h 2689626"/>
+              <a:gd name="connsiteX1" fmla="*/ 205317 w 7977717"/>
+              <a:gd name="connsiteY1" fmla="*/ 2074375 h 2689626"/>
+              <a:gd name="connsiteX2" fmla="*/ 1386417 w 7977717"/>
+              <a:gd name="connsiteY2" fmla="*/ 2353775 h 2689626"/>
+              <a:gd name="connsiteX3" fmla="*/ 2232248 w 7977717"/>
+              <a:gd name="connsiteY3" fmla="*/ 59267 h 2689626"/>
+              <a:gd name="connsiteX4" fmla="*/ 2834217 w 7977717"/>
+              <a:gd name="connsiteY4" fmla="*/ 1998175 h 2689626"/>
+              <a:gd name="connsiteX5" fmla="*/ 3743855 w 7977717"/>
+              <a:gd name="connsiteY5" fmla="*/ 2502975 h 2689626"/>
+              <a:gd name="connsiteX6" fmla="*/ 4955117 w 7977717"/>
+              <a:gd name="connsiteY6" fmla="*/ 2290275 h 2689626"/>
+              <a:gd name="connsiteX7" fmla="*/ 5688632 w 7977717"/>
+              <a:gd name="connsiteY7" fmla="*/ 1211395 h 2689626"/>
+              <a:gd name="connsiteX8" fmla="*/ 6199717 w 7977717"/>
+              <a:gd name="connsiteY8" fmla="*/ 1528275 h 2689626"/>
+              <a:gd name="connsiteX9" fmla="*/ 6898217 w 7977717"/>
+              <a:gd name="connsiteY9" fmla="*/ 2264875 h 2689626"/>
+              <a:gd name="connsiteX10" fmla="*/ 7977717 w 7977717"/>
+              <a:gd name="connsiteY10" fmla="*/ 2633175 h 2689626"/>
+              <a:gd name="connsiteX0" fmla="*/ 154517 w 7977717"/>
+              <a:gd name="connsiteY0" fmla="*/ 2048975 h 2689626"/>
+              <a:gd name="connsiteX1" fmla="*/ 205317 w 7977717"/>
+              <a:gd name="connsiteY1" fmla="*/ 2074375 h 2689626"/>
+              <a:gd name="connsiteX2" fmla="*/ 1386417 w 7977717"/>
+              <a:gd name="connsiteY2" fmla="*/ 2353775 h 2689626"/>
+              <a:gd name="connsiteX3" fmla="*/ 2232248 w 7977717"/>
+              <a:gd name="connsiteY3" fmla="*/ 59267 h 2689626"/>
+              <a:gd name="connsiteX4" fmla="*/ 2834217 w 7977717"/>
+              <a:gd name="connsiteY4" fmla="*/ 1998175 h 2689626"/>
+              <a:gd name="connsiteX5" fmla="*/ 3743855 w 7977717"/>
+              <a:gd name="connsiteY5" fmla="*/ 2502975 h 2689626"/>
+              <a:gd name="connsiteX6" fmla="*/ 4955117 w 7977717"/>
+              <a:gd name="connsiteY6" fmla="*/ 2290275 h 2689626"/>
+              <a:gd name="connsiteX7" fmla="*/ 5760640 w 7977717"/>
+              <a:gd name="connsiteY7" fmla="*/ 1151806 h 2689626"/>
+              <a:gd name="connsiteX8" fmla="*/ 6199717 w 7977717"/>
+              <a:gd name="connsiteY8" fmla="*/ 1528275 h 2689626"/>
+              <a:gd name="connsiteX9" fmla="*/ 6898217 w 7977717"/>
+              <a:gd name="connsiteY9" fmla="*/ 2264875 h 2689626"/>
+              <a:gd name="connsiteX10" fmla="*/ 7977717 w 7977717"/>
+              <a:gd name="connsiteY10" fmla="*/ 2633175 h 2689626"/>
+            </a:gdLst>
+            <a:ahLst/>
+            <a:cxnLst>
+              <a:cxn ang="0">
+                <a:pos x="connsiteX0" y="connsiteY0"/>
+              </a:cxn>
+              <a:cxn ang="0">
+                <a:pos x="connsiteX1" y="connsiteY1"/>
+              </a:cxn>
+              <a:cxn ang="0">
+                <a:pos x="connsiteX2" y="connsiteY2"/>
+              </a:cxn>
+              <a:cxn ang="0">
+                <a:pos x="connsiteX3" y="connsiteY3"/>
+              </a:cxn>
+              <a:cxn ang="0">
+                <a:pos x="connsiteX4" y="connsiteY4"/>
+              </a:cxn>
+              <a:cxn ang="0">
+                <a:pos x="connsiteX5" y="connsiteY5"/>
+              </a:cxn>
+              <a:cxn ang="0">
+                <a:pos x="connsiteX6" y="connsiteY6"/>
+              </a:cxn>
+              <a:cxn ang="0">
+                <a:pos x="connsiteX7" y="connsiteY7"/>
+              </a:cxn>
+              <a:cxn ang="0">
+                <a:pos x="connsiteX8" y="connsiteY8"/>
+              </a:cxn>
+              <a:cxn ang="0">
+                <a:pos x="connsiteX9" y="connsiteY9"/>
+              </a:cxn>
+              <a:cxn ang="0">
+                <a:pos x="connsiteX10" y="connsiteY10"/>
+              </a:cxn>
+            </a:cxnLst>
+            <a:rect l="l" t="t" r="r" b="b"/>
+            <a:pathLst>
+              <a:path w="7977717" h="2689626">
+                <a:moveTo>
+                  <a:pt x="154517" y="2048975"/>
+                </a:moveTo>
+                <a:cubicBezTo>
+                  <a:pt x="77258" y="2036275"/>
+                  <a:pt x="0" y="2023575"/>
+                  <a:pt x="205317" y="2074375"/>
+                </a:cubicBezTo>
+                <a:cubicBezTo>
+                  <a:pt x="410634" y="2125175"/>
+                  <a:pt x="1048595" y="2689626"/>
+                  <a:pt x="1386417" y="2353775"/>
+                </a:cubicBezTo>
+                <a:cubicBezTo>
+                  <a:pt x="1724239" y="2017924"/>
+                  <a:pt x="1990948" y="118534"/>
+                  <a:pt x="2232248" y="59267"/>
+                </a:cubicBezTo>
+                <a:cubicBezTo>
+                  <a:pt x="2473548" y="0"/>
+                  <a:pt x="2582283" y="1590890"/>
+                  <a:pt x="2834217" y="1998175"/>
+                </a:cubicBezTo>
+                <a:cubicBezTo>
+                  <a:pt x="3086151" y="2405460"/>
+                  <a:pt x="3390372" y="2454292"/>
+                  <a:pt x="3743855" y="2502975"/>
+                </a:cubicBezTo>
+                <a:cubicBezTo>
+                  <a:pt x="4097338" y="2551658"/>
+                  <a:pt x="4618986" y="2515470"/>
+                  <a:pt x="4955117" y="2290275"/>
+                </a:cubicBezTo>
+                <a:cubicBezTo>
+                  <a:pt x="5291248" y="2065080"/>
+                  <a:pt x="5560723" y="1295326"/>
+                  <a:pt x="5760640" y="1151806"/>
+                </a:cubicBezTo>
+                <a:cubicBezTo>
+                  <a:pt x="5968073" y="1024806"/>
+                  <a:pt x="5998120" y="1352695"/>
+                  <a:pt x="6199717" y="1528275"/>
+                </a:cubicBezTo>
+                <a:cubicBezTo>
+                  <a:pt x="6361726" y="1788439"/>
+                  <a:pt x="6601884" y="2080725"/>
+                  <a:pt x="6898217" y="2264875"/>
+                </a:cubicBezTo>
+                <a:cubicBezTo>
+                  <a:pt x="7194550" y="2449025"/>
+                  <a:pt x="7586133" y="2541100"/>
+                  <a:pt x="7977717" y="2633175"/>
+                </a:cubicBezTo>
+              </a:path>
+            </a:pathLst>
+          </a:custGeom>
+          <a:noFill/>
+          <a:ln w="19050" cap="flat" cmpd="sng" algn="ctr">
+            <a:solidFill>
+              <a:schemeClr val="accent5">
+                <a:lumMod val="50000"/>
+              </a:schemeClr>
+            </a:solidFill>
+            <a:prstDash val="sysDash"/>
+            <a:round/>
+            <a:headEnd type="none" w="med" len="med"/>
+            <a:tailEnd type="none" w="med" len="med"/>
+          </a:ln>
+          <a:effectLst/>
+        </p:spPr>
+        <p:txBody>
+          <a:bodyPr vert="horz" wrap="square" lIns="91440" tIns="45720" rIns="91440" bIns="45720" numCol="1" rtlCol="0" anchor="t" anchorCtr="0" compatLnSpc="1">
+            <a:prstTxWarp prst="textNoShape">
+              <a:avLst/>
+            </a:prstTxWarp>
+          </a:bodyPr>
+          <a:lstStyle/>
+          <a:p>
+            <a:pPr marL="0" marR="0" indent="0" algn="l" defTabSz="914400" rtl="0" eaLnBrk="1" fontAlgn="base" latinLnBrk="0" hangingPunct="1">
+              <a:lnSpc>
+                <a:spcPct val="100000"/>
+              </a:lnSpc>
+              <a:spcBef>
+                <a:spcPct val="0"/>
+              </a:spcBef>
+              <a:spcAft>
+                <a:spcPct val="0"/>
+              </a:spcAft>
+              <a:buClrTx/>
+              <a:buSzTx/>
+              <a:buFontTx/>
+              <a:buNone/>
+              <a:tabLst/>
+            </a:pPr>
+            <a:endParaRPr kumimoji="0" lang="de-DE" sz="1600" b="0" i="0" u="none" strike="noStrike" cap="none" normalizeH="0" baseline="0" smtClean="0">
+              <a:ln>
+                <a:noFill/>
+              </a:ln>
+              <a:solidFill>
+                <a:schemeClr val="tx1"/>
+              </a:solidFill>
+              <a:effectLst/>
+              <a:latin typeface="Arial" charset="0"/>
+            </a:endParaRPr>
+          </a:p>
+        </p:txBody>
+      </p:sp>
+      <p:sp>
+        <p:nvSpPr>
+          <p:cNvPr id="12" name="Textfeld 11"/>
           <p:cNvSpPr txBox="1"/>
           <p:nvPr/>
         </p:nvSpPr>
         <p:spPr>
           <a:xfrm>
-            <a:off x="250824" y="4818360"/>
-            <a:ext cx="9001696" cy="400110"/>
+            <a:off x="3347418" y="3068638"/>
+            <a:ext cx="2160240" cy="400110"/>
           </a:xfrm>
           <a:prstGeom prst="rect">
             <a:avLst/>
@@ -11056,395 +11789,25 @@
           </a:bodyPr>
           <a:lstStyle/>
           <a:p>
-            <a:pPr>
-              <a:spcAft>
-                <a:spcPts val="600"/>
-              </a:spcAft>
-              <a:tabLst>
-                <a:tab pos="1974850" algn="l"/>
-              </a:tabLst>
-            </a:pPr>
-            <a:r>
-              <a:rPr lang="de-DE" sz="2000" dirty="0" smtClean="0">
-                <a:latin typeface="Calibri" pitchFamily="34" charset="0"/>
-              </a:rPr>
-              <a:t>Übereinstimmung	: ein quantitatives Fehlermaß/</a:t>
-            </a:r>
-            <a:r>
-              <a:rPr lang="de-DE" sz="2000" dirty="0" err="1" smtClean="0">
-                <a:latin typeface="Calibri" pitchFamily="34" charset="0"/>
-              </a:rPr>
-              <a:t>Gütemaß</a:t>
-            </a:r>
-            <a:r>
-              <a:rPr lang="de-DE" sz="2000" dirty="0" smtClean="0">
-                <a:latin typeface="Calibri" pitchFamily="34" charset="0"/>
-              </a:rPr>
-              <a:t>  </a:t>
-            </a:r>
-            <a:r>
-              <a:rPr lang="de-DE" sz="2000" dirty="0" smtClean="0">
-                <a:latin typeface="Courier New" pitchFamily="49" charset="0"/>
-                <a:cs typeface="Courier New" pitchFamily="49" charset="0"/>
-              </a:rPr>
-              <a:t>x(</a:t>
-            </a:r>
-            <a:r>
-              <a:rPr lang="de-DE" sz="2000" dirty="0" err="1" smtClean="0">
-                <a:latin typeface="Courier New" pitchFamily="49" charset="0"/>
-                <a:cs typeface="Courier New" pitchFamily="49" charset="0"/>
-              </a:rPr>
-              <a:t>Q</a:t>
-            </a:r>
-            <a:r>
-              <a:rPr lang="de-DE" sz="2000" baseline="-25000" dirty="0" err="1" smtClean="0">
-                <a:latin typeface="Courier New" pitchFamily="49" charset="0"/>
-                <a:cs typeface="Courier New" pitchFamily="49" charset="0"/>
-              </a:rPr>
-              <a:t>obs</a:t>
-            </a:r>
-            <a:r>
-              <a:rPr lang="de-DE" sz="2000" dirty="0" err="1" smtClean="0">
-                <a:latin typeface="Courier New" pitchFamily="49" charset="0"/>
-                <a:cs typeface="Courier New" pitchFamily="49" charset="0"/>
-              </a:rPr>
-              <a:t>,Q</a:t>
-            </a:r>
-            <a:r>
-              <a:rPr lang="de-DE" sz="2000" baseline="-25000" dirty="0" err="1" smtClean="0">
-                <a:latin typeface="Courier New" pitchFamily="49" charset="0"/>
-                <a:cs typeface="Courier New" pitchFamily="49" charset="0"/>
-              </a:rPr>
-              <a:t>sim</a:t>
-            </a:r>
-            <a:r>
-              <a:rPr lang="de-DE" sz="2000" dirty="0" smtClean="0">
-                <a:latin typeface="Courier New" pitchFamily="49" charset="0"/>
-                <a:cs typeface="Courier New" pitchFamily="49" charset="0"/>
-              </a:rPr>
-              <a:t>(par))</a:t>
-            </a:r>
-            <a:r>
-              <a:rPr lang="de-DE" sz="2000" dirty="0" smtClean="0">
-                <a:latin typeface="Calibri" pitchFamily="34" charset="0"/>
-              </a:rPr>
-              <a:t>  </a:t>
-            </a:r>
-          </a:p>
-        </p:txBody>
-      </p:sp>
-      <p:sp>
-        <p:nvSpPr>
-          <p:cNvPr id="55" name="Textfeld 54"/>
-          <p:cNvSpPr txBox="1"/>
-          <p:nvPr/>
-        </p:nvSpPr>
-        <p:spPr>
-          <a:xfrm>
-            <a:off x="250825" y="5221096"/>
-            <a:ext cx="8713788" cy="400110"/>
-          </a:xfrm>
-          <a:prstGeom prst="rect">
-            <a:avLst/>
-          </a:prstGeom>
-          <a:noFill/>
-        </p:spPr>
-        <p:txBody>
-          <a:bodyPr wrap="square" rtlCol="0">
-            <a:spAutoFit/>
-          </a:bodyPr>
-          <a:lstStyle/>
-          <a:p>
-            <a:pPr>
-              <a:spcAft>
-                <a:spcPts val="600"/>
-              </a:spcAft>
-              <a:tabLst>
-                <a:tab pos="1974850" algn="l"/>
-              </a:tabLst>
-            </a:pPr>
-            <a:r>
-              <a:rPr lang="de-DE" sz="2000" dirty="0" smtClean="0">
-                <a:latin typeface="Calibri" pitchFamily="34" charset="0"/>
-              </a:rPr>
-              <a:t>Suche	: Suchalgorithmus, der </a:t>
-            </a:r>
-            <a:r>
-              <a:rPr lang="de-DE" sz="2000" dirty="0" smtClean="0">
-                <a:latin typeface="Courier New" pitchFamily="49" charset="0"/>
-                <a:cs typeface="Courier New" pitchFamily="49" charset="0"/>
-              </a:rPr>
-              <a:t>x(par) </a:t>
-            </a:r>
-            <a:r>
-              <a:rPr lang="de-DE" sz="2000" dirty="0" smtClean="0">
-                <a:latin typeface="Calibri" pitchFamily="34" charset="0"/>
-              </a:rPr>
-              <a:t>maximiert /minimiert</a:t>
-            </a:r>
-          </a:p>
-        </p:txBody>
-      </p:sp>
-      <p:sp>
-        <p:nvSpPr>
-          <p:cNvPr id="56" name="Textfeld 55"/>
-          <p:cNvSpPr txBox="1"/>
-          <p:nvPr/>
-        </p:nvSpPr>
-        <p:spPr>
-          <a:xfrm>
-            <a:off x="0" y="2874144"/>
-            <a:ext cx="9144000" cy="1015663"/>
-          </a:xfrm>
-          <a:prstGeom prst="rect">
-            <a:avLst/>
-          </a:prstGeom>
-          <a:solidFill>
-            <a:srgbClr val="2B5681"/>
-          </a:solidFill>
-        </p:spPr>
-        <p:txBody>
-          <a:bodyPr wrap="square" rtlCol="0">
-            <a:spAutoFit/>
-          </a:bodyPr>
-          <a:lstStyle/>
-          <a:p>
-            <a:pPr algn="ctr">
-              <a:spcAft>
-                <a:spcPts val="600"/>
-              </a:spcAft>
-            </a:pPr>
             <a:r>
               <a:rPr lang="de-DE" sz="2000" dirty="0" smtClean="0">
                 <a:solidFill>
-                  <a:schemeClr val="accent5">
+                  <a:schemeClr val="accent1">
                     <a:lumMod val="75000"/>
                   </a:schemeClr>
                 </a:solidFill>
                 <a:latin typeface="Calibri" pitchFamily="34" charset="0"/>
               </a:rPr>
-              <a:t>Suche</a:t>
-            </a:r>
-            <a:r>
-              <a:rPr lang="de-DE" sz="2000" dirty="0" smtClean="0">
-                <a:solidFill>
-                  <a:schemeClr val="bg1"/>
-                </a:solidFill>
-                <a:latin typeface="Calibri" pitchFamily="34" charset="0"/>
-              </a:rPr>
-              <a:t> eine Kombination von Parametern (</a:t>
-            </a:r>
-            <a:r>
-              <a:rPr lang="de-DE" sz="2000" dirty="0" smtClean="0">
-                <a:solidFill>
-                  <a:schemeClr val="bg1"/>
-                </a:solidFill>
-                <a:latin typeface="Courier New" pitchFamily="49" charset="0"/>
-                <a:cs typeface="Courier New" pitchFamily="49" charset="0"/>
-              </a:rPr>
-              <a:t>par</a:t>
-            </a:r>
-            <a:r>
-              <a:rPr lang="de-DE" sz="2000" dirty="0" smtClean="0">
-                <a:solidFill>
-                  <a:schemeClr val="bg1"/>
-                </a:solidFill>
-                <a:latin typeface="Calibri" pitchFamily="34" charset="0"/>
-              </a:rPr>
-              <a:t>), </a:t>
-            </a:r>
-            <a:br>
-              <a:rPr lang="de-DE" sz="2000" dirty="0" smtClean="0">
-                <a:solidFill>
-                  <a:schemeClr val="bg1"/>
-                </a:solidFill>
-                <a:latin typeface="Calibri" pitchFamily="34" charset="0"/>
-              </a:rPr>
-            </a:br>
-            <a:r>
-              <a:rPr lang="de-DE" sz="2000" dirty="0" smtClean="0">
-                <a:solidFill>
-                  <a:schemeClr val="bg1"/>
-                </a:solidFill>
-                <a:latin typeface="Calibri" pitchFamily="34" charset="0"/>
-              </a:rPr>
-              <a:t>so dass </a:t>
-            </a:r>
-            <a:r>
-              <a:rPr lang="de-DE" sz="2000" dirty="0" smtClean="0">
-                <a:solidFill>
-                  <a:schemeClr val="accent5">
-                    <a:lumMod val="75000"/>
-                  </a:schemeClr>
-                </a:solidFill>
-                <a:latin typeface="Calibri" pitchFamily="34" charset="0"/>
-              </a:rPr>
-              <a:t>Beobachtung</a:t>
-            </a:r>
-            <a:r>
-              <a:rPr lang="de-DE" sz="2000" dirty="0" smtClean="0">
-                <a:solidFill>
-                  <a:schemeClr val="bg1"/>
-                </a:solidFill>
-                <a:latin typeface="Calibri" pitchFamily="34" charset="0"/>
-              </a:rPr>
-              <a:t> und </a:t>
-            </a:r>
-            <a:r>
-              <a:rPr lang="de-DE" sz="2000" dirty="0" smtClean="0">
-                <a:solidFill>
-                  <a:schemeClr val="accent5">
-                    <a:lumMod val="75000"/>
-                  </a:schemeClr>
-                </a:solidFill>
-                <a:latin typeface="Calibri" pitchFamily="34" charset="0"/>
-              </a:rPr>
-              <a:t>Simulation</a:t>
-            </a:r>
-            <a:r>
-              <a:rPr lang="de-DE" sz="2000" dirty="0" smtClean="0">
-                <a:solidFill>
-                  <a:schemeClr val="bg1"/>
-                </a:solidFill>
-                <a:latin typeface="Calibri" pitchFamily="34" charset="0"/>
-              </a:rPr>
-              <a:t> </a:t>
-            </a:r>
-            <a:br>
-              <a:rPr lang="de-DE" sz="2000" dirty="0" smtClean="0">
-                <a:solidFill>
-                  <a:schemeClr val="bg1"/>
-                </a:solidFill>
-                <a:latin typeface="Calibri" pitchFamily="34" charset="0"/>
-              </a:rPr>
-            </a:br>
-            <a:r>
-              <a:rPr lang="de-DE" sz="2000" dirty="0" smtClean="0">
-                <a:solidFill>
-                  <a:schemeClr val="bg1"/>
-                </a:solidFill>
-                <a:latin typeface="Calibri" pitchFamily="34" charset="0"/>
-              </a:rPr>
-              <a:t>möglichst gut </a:t>
-            </a:r>
-            <a:r>
-              <a:rPr lang="de-DE" sz="2000" dirty="0" smtClean="0">
-                <a:solidFill>
-                  <a:schemeClr val="accent5">
-                    <a:lumMod val="75000"/>
-                  </a:schemeClr>
-                </a:solidFill>
-                <a:latin typeface="Calibri" pitchFamily="34" charset="0"/>
-              </a:rPr>
-              <a:t>übereinstimmen</a:t>
-            </a:r>
-            <a:r>
-              <a:rPr lang="de-DE" sz="2000" dirty="0" smtClean="0">
-                <a:solidFill>
-                  <a:schemeClr val="bg1"/>
-                </a:solidFill>
-                <a:latin typeface="Calibri" pitchFamily="34" charset="0"/>
-              </a:rPr>
-              <a:t>.</a:t>
-            </a:r>
-          </a:p>
-        </p:txBody>
-      </p:sp>
-      <p:sp>
-        <p:nvSpPr>
-          <p:cNvPr id="58" name="Textfeld 57"/>
-          <p:cNvSpPr txBox="1"/>
-          <p:nvPr/>
-        </p:nvSpPr>
-        <p:spPr>
-          <a:xfrm>
-            <a:off x="251520" y="5667786"/>
-            <a:ext cx="2304256" cy="400110"/>
-          </a:xfrm>
-          <a:prstGeom prst="rect">
-            <a:avLst/>
-          </a:prstGeom>
-          <a:noFill/>
-        </p:spPr>
-        <p:txBody>
-          <a:bodyPr wrap="square" rtlCol="0">
-            <a:spAutoFit/>
-          </a:bodyPr>
-          <a:lstStyle/>
-          <a:p>
-            <a:pPr>
-              <a:spcAft>
-                <a:spcPts val="600"/>
-              </a:spcAft>
-              <a:tabLst>
-                <a:tab pos="1974850" algn="l"/>
-              </a:tabLst>
-            </a:pPr>
-            <a:r>
-              <a:rPr lang="de-DE" sz="2000" dirty="0" smtClean="0">
-                <a:latin typeface="Calibri" pitchFamily="34" charset="0"/>
-              </a:rPr>
-              <a:t>Beispiel	:</a:t>
-            </a:r>
-          </a:p>
-        </p:txBody>
-      </p:sp>
-      <p:graphicFrame>
-        <p:nvGraphicFramePr>
-          <p:cNvPr id="59" name="Objekt 58"/>
-          <p:cNvGraphicFramePr>
-            <a:graphicFrameLocks noChangeAspect="1"/>
-          </p:cNvGraphicFramePr>
-          <p:nvPr/>
-        </p:nvGraphicFramePr>
-        <p:xfrm>
-          <a:off x="2407624" y="5542632"/>
-          <a:ext cx="3162298" cy="707356"/>
-        </p:xfrm>
-        <a:graphic>
-          <a:graphicData uri="http://schemas.openxmlformats.org/presentationml/2006/ole">
-            <p:oleObj spid="_x0000_s1026" name="Formel" r:id="rId4" imgW="1930320" imgH="431640" progId="Equation.3">
-              <p:embed/>
-            </p:oleObj>
-          </a:graphicData>
-        </a:graphic>
-      </p:graphicFrame>
-      <p:sp>
-        <p:nvSpPr>
-          <p:cNvPr id="60" name="Textfeld 59"/>
-          <p:cNvSpPr txBox="1"/>
-          <p:nvPr/>
-        </p:nvSpPr>
-        <p:spPr>
-          <a:xfrm>
-            <a:off x="5668789" y="5705886"/>
-            <a:ext cx="3475211" cy="400110"/>
-          </a:xfrm>
-          <a:prstGeom prst="rect">
-            <a:avLst/>
-          </a:prstGeom>
-          <a:noFill/>
-        </p:spPr>
-        <p:txBody>
-          <a:bodyPr wrap="square" rtlCol="0">
-            <a:spAutoFit/>
-          </a:bodyPr>
-          <a:lstStyle/>
-          <a:p>
-            <a:pPr>
-              <a:spcAft>
-                <a:spcPts val="600"/>
-              </a:spcAft>
-              <a:tabLst>
-                <a:tab pos="1974850" algn="l"/>
-              </a:tabLst>
-            </a:pPr>
-            <a:r>
-              <a:rPr lang="de-DE" sz="2000" i="1" dirty="0" smtClean="0">
-                <a:latin typeface="Calibri" pitchFamily="34" charset="0"/>
-              </a:rPr>
-              <a:t>(SSE… sollte minimal werden)</a:t>
-            </a:r>
+              <a:t>simuliert #2</a:t>
+            </a:r>
+            <a:endParaRPr lang="de-DE" sz="2000" dirty="0">
+              <a:solidFill>
+                <a:schemeClr val="accent1">
+                  <a:lumMod val="75000"/>
+                </a:schemeClr>
+              </a:solidFill>
+              <a:latin typeface="Calibri" pitchFamily="34" charset="0"/>
+            </a:endParaRPr>
           </a:p>
         </p:txBody>
       </p:sp>
@@ -11459,698 +11822,9 @@
   <p:timing>
     <p:tnLst>
       <p:par>
-        <p:cTn id="1" dur="indefinite" restart="never" nodeType="tmRoot">
-          <p:childTnLst>
-            <p:seq concurrent="1" nextAc="seek">
-              <p:cTn id="2" dur="indefinite" nodeType="mainSeq">
-                <p:childTnLst>
-                  <p:par>
-                    <p:cTn id="3" fill="hold">
-                      <p:stCondLst>
-                        <p:cond delay="indefinite"/>
-                      </p:stCondLst>
-                      <p:childTnLst>
-                        <p:par>
-                          <p:cTn id="4" fill="hold">
-                            <p:stCondLst>
-                              <p:cond delay="0"/>
-                            </p:stCondLst>
-                            <p:childTnLst>
-                              <p:par>
-                                <p:cTn id="5" presetID="22" presetClass="entr" presetSubtype="8" fill="hold" grpId="0" nodeType="clickEffect">
-                                  <p:stCondLst>
-                                    <p:cond delay="0"/>
-                                  </p:stCondLst>
-                                  <p:childTnLst>
-                                    <p:set>
-                                      <p:cBhvr>
-                                        <p:cTn id="6" dur="1" fill="hold">
-                                          <p:stCondLst>
-                                            <p:cond delay="0"/>
-                                          </p:stCondLst>
-                                        </p:cTn>
-                                        <p:tgtEl>
-                                          <p:spTgt spid="23"/>
-                                        </p:tgtEl>
-                                        <p:attrNameLst>
-                                          <p:attrName>style.visibility</p:attrName>
-                                        </p:attrNameLst>
-                                      </p:cBhvr>
-                                      <p:to>
-                                        <p:strVal val="visible"/>
-                                      </p:to>
-                                    </p:set>
-                                    <p:animEffect transition="in" filter="wipe(left)">
-                                      <p:cBhvr>
-                                        <p:cTn id="7" dur="500"/>
-                                        <p:tgtEl>
-                                          <p:spTgt spid="23"/>
-                                        </p:tgtEl>
-                                      </p:cBhvr>
-                                    </p:animEffect>
-                                  </p:childTnLst>
-                                </p:cTn>
-                              </p:par>
-                            </p:childTnLst>
-                          </p:cTn>
-                        </p:par>
-                      </p:childTnLst>
-                    </p:cTn>
-                  </p:par>
-                  <p:par>
-                    <p:cTn id="8" fill="hold">
-                      <p:stCondLst>
-                        <p:cond delay="indefinite"/>
-                      </p:stCondLst>
-                      <p:childTnLst>
-                        <p:par>
-                          <p:cTn id="9" fill="hold">
-                            <p:stCondLst>
-                              <p:cond delay="0"/>
-                            </p:stCondLst>
-                            <p:childTnLst>
-                              <p:par>
-                                <p:cTn id="10" presetID="22" presetClass="entr" presetSubtype="1" fill="hold" grpId="0" nodeType="clickEffect">
-                                  <p:stCondLst>
-                                    <p:cond delay="0"/>
-                                  </p:stCondLst>
-                                  <p:childTnLst>
-                                    <p:set>
-                                      <p:cBhvr>
-                                        <p:cTn id="11" dur="1" fill="hold">
-                                          <p:stCondLst>
-                                            <p:cond delay="0"/>
-                                          </p:stCondLst>
-                                        </p:cTn>
-                                        <p:tgtEl>
-                                          <p:spTgt spid="29">
-                                            <p:txEl>
-                                              <p:pRg st="0" end="0"/>
-                                            </p:txEl>
-                                          </p:spTgt>
-                                        </p:tgtEl>
-                                        <p:attrNameLst>
-                                          <p:attrName>style.visibility</p:attrName>
-                                        </p:attrNameLst>
-                                      </p:cBhvr>
-                                      <p:to>
-                                        <p:strVal val="visible"/>
-                                      </p:to>
-                                    </p:set>
-                                    <p:animEffect transition="in" filter="wipe(up)">
-                                      <p:cBhvr>
-                                        <p:cTn id="12" dur="500"/>
-                                        <p:tgtEl>
-                                          <p:spTgt spid="29">
-                                            <p:txEl>
-                                              <p:pRg st="0" end="0"/>
-                                            </p:txEl>
-                                          </p:spTgt>
-                                        </p:tgtEl>
-                                      </p:cBhvr>
-                                    </p:animEffect>
-                                  </p:childTnLst>
-                                </p:cTn>
-                              </p:par>
-                            </p:childTnLst>
-                          </p:cTn>
-                        </p:par>
-                      </p:childTnLst>
-                    </p:cTn>
-                  </p:par>
-                  <p:par>
-                    <p:cTn id="13" fill="hold">
-                      <p:stCondLst>
-                        <p:cond delay="indefinite"/>
-                      </p:stCondLst>
-                      <p:childTnLst>
-                        <p:par>
-                          <p:cTn id="14" fill="hold">
-                            <p:stCondLst>
-                              <p:cond delay="0"/>
-                            </p:stCondLst>
-                            <p:childTnLst>
-                              <p:par>
-                                <p:cTn id="15" presetID="22" presetClass="entr" presetSubtype="1" fill="hold" grpId="0" nodeType="clickEffect">
-                                  <p:stCondLst>
-                                    <p:cond delay="0"/>
-                                  </p:stCondLst>
-                                  <p:childTnLst>
-                                    <p:set>
-                                      <p:cBhvr>
-                                        <p:cTn id="16" dur="1" fill="hold">
-                                          <p:stCondLst>
-                                            <p:cond delay="0"/>
-                                          </p:stCondLst>
-                                        </p:cTn>
-                                        <p:tgtEl>
-                                          <p:spTgt spid="29">
-                                            <p:txEl>
-                                              <p:pRg st="1" end="1"/>
-                                            </p:txEl>
-                                          </p:spTgt>
-                                        </p:tgtEl>
-                                        <p:attrNameLst>
-                                          <p:attrName>style.visibility</p:attrName>
-                                        </p:attrNameLst>
-                                      </p:cBhvr>
-                                      <p:to>
-                                        <p:strVal val="visible"/>
-                                      </p:to>
-                                    </p:set>
-                                    <p:animEffect transition="in" filter="wipe(up)">
-                                      <p:cBhvr>
-                                        <p:cTn id="17" dur="500"/>
-                                        <p:tgtEl>
-                                          <p:spTgt spid="29">
-                                            <p:txEl>
-                                              <p:pRg st="1" end="1"/>
-                                            </p:txEl>
-                                          </p:spTgt>
-                                        </p:tgtEl>
-                                      </p:cBhvr>
-                                    </p:animEffect>
-                                  </p:childTnLst>
-                                </p:cTn>
-                              </p:par>
-                            </p:childTnLst>
-                          </p:cTn>
-                        </p:par>
-                      </p:childTnLst>
-                    </p:cTn>
-                  </p:par>
-                  <p:par>
-                    <p:cTn id="18" fill="hold">
-                      <p:stCondLst>
-                        <p:cond delay="indefinite"/>
-                      </p:stCondLst>
-                      <p:childTnLst>
-                        <p:par>
-                          <p:cTn id="19" fill="hold">
-                            <p:stCondLst>
-                              <p:cond delay="0"/>
-                            </p:stCondLst>
-                            <p:childTnLst>
-                              <p:par>
-                                <p:cTn id="20" presetID="23" presetClass="entr" presetSubtype="288" fill="hold" grpId="0" nodeType="clickEffect">
-                                  <p:stCondLst>
-                                    <p:cond delay="0"/>
-                                  </p:stCondLst>
-                                  <p:childTnLst>
-                                    <p:set>
-                                      <p:cBhvr>
-                                        <p:cTn id="21" dur="1" fill="hold">
-                                          <p:stCondLst>
-                                            <p:cond delay="0"/>
-                                          </p:stCondLst>
-                                        </p:cTn>
-                                        <p:tgtEl>
-                                          <p:spTgt spid="28"/>
-                                        </p:tgtEl>
-                                        <p:attrNameLst>
-                                          <p:attrName>style.visibility</p:attrName>
-                                        </p:attrNameLst>
-                                      </p:cBhvr>
-                                      <p:to>
-                                        <p:strVal val="visible"/>
-                                      </p:to>
-                                    </p:set>
-                                    <p:anim calcmode="lin" valueType="num">
-                                      <p:cBhvr>
-                                        <p:cTn id="22" dur="500" fill="hold"/>
-                                        <p:tgtEl>
-                                          <p:spTgt spid="28"/>
-                                        </p:tgtEl>
-                                        <p:attrNameLst>
-                                          <p:attrName>ppt_w</p:attrName>
-                                        </p:attrNameLst>
-                                      </p:cBhvr>
-                                      <p:tavLst>
-                                        <p:tav tm="0">
-                                          <p:val>
-                                            <p:strVal val="4/3*#ppt_w"/>
-                                          </p:val>
-                                        </p:tav>
-                                        <p:tav tm="100000">
-                                          <p:val>
-                                            <p:strVal val="#ppt_w"/>
-                                          </p:val>
-                                        </p:tav>
-                                      </p:tavLst>
-                                    </p:anim>
-                                    <p:anim calcmode="lin" valueType="num">
-                                      <p:cBhvr>
-                                        <p:cTn id="23" dur="500" fill="hold"/>
-                                        <p:tgtEl>
-                                          <p:spTgt spid="28"/>
-                                        </p:tgtEl>
-                                        <p:attrNameLst>
-                                          <p:attrName>ppt_h</p:attrName>
-                                        </p:attrNameLst>
-                                      </p:cBhvr>
-                                      <p:tavLst>
-                                        <p:tav tm="0">
-                                          <p:val>
-                                            <p:strVal val="4/3*#ppt_h"/>
-                                          </p:val>
-                                        </p:tav>
-                                        <p:tav tm="100000">
-                                          <p:val>
-                                            <p:strVal val="#ppt_h"/>
-                                          </p:val>
-                                        </p:tav>
-                                      </p:tavLst>
-                                    </p:anim>
-                                  </p:childTnLst>
-                                </p:cTn>
-                              </p:par>
-                            </p:childTnLst>
-                          </p:cTn>
-                        </p:par>
-                      </p:childTnLst>
-                    </p:cTn>
-                  </p:par>
-                  <p:par>
-                    <p:cTn id="24" fill="hold">
-                      <p:stCondLst>
-                        <p:cond delay="indefinite"/>
-                      </p:stCondLst>
-                      <p:childTnLst>
-                        <p:par>
-                          <p:cTn id="25" fill="hold">
-                            <p:stCondLst>
-                              <p:cond delay="0"/>
-                            </p:stCondLst>
-                            <p:childTnLst>
-                              <p:par>
-                                <p:cTn id="26" presetID="9" presetClass="entr" presetSubtype="0" fill="hold" grpId="0" nodeType="clickEffect">
-                                  <p:stCondLst>
-                                    <p:cond delay="0"/>
-                                  </p:stCondLst>
-                                  <p:childTnLst>
-                                    <p:set>
-                                      <p:cBhvr>
-                                        <p:cTn id="27" dur="1" fill="hold">
-                                          <p:stCondLst>
-                                            <p:cond delay="0"/>
-                                          </p:stCondLst>
-                                        </p:cTn>
-                                        <p:tgtEl>
-                                          <p:spTgt spid="56"/>
-                                        </p:tgtEl>
-                                        <p:attrNameLst>
-                                          <p:attrName>style.visibility</p:attrName>
-                                        </p:attrNameLst>
-                                      </p:cBhvr>
-                                      <p:to>
-                                        <p:strVal val="visible"/>
-                                      </p:to>
-                                    </p:set>
-                                    <p:animEffect transition="in" filter="dissolve">
-                                      <p:cBhvr>
-                                        <p:cTn id="28" dur="500"/>
-                                        <p:tgtEl>
-                                          <p:spTgt spid="56"/>
-                                        </p:tgtEl>
-                                      </p:cBhvr>
-                                    </p:animEffect>
-                                  </p:childTnLst>
-                                </p:cTn>
-                              </p:par>
-                            </p:childTnLst>
-                          </p:cTn>
-                        </p:par>
-                      </p:childTnLst>
-                    </p:cTn>
-                  </p:par>
-                  <p:par>
-                    <p:cTn id="29" fill="hold">
-                      <p:stCondLst>
-                        <p:cond delay="indefinite"/>
-                      </p:stCondLst>
-                      <p:childTnLst>
-                        <p:par>
-                          <p:cTn id="30" fill="hold">
-                            <p:stCondLst>
-                              <p:cond delay="0"/>
-                            </p:stCondLst>
-                            <p:childTnLst>
-                              <p:par>
-                                <p:cTn id="31" presetID="9" presetClass="entr" presetSubtype="0" fill="hold" grpId="0" nodeType="clickEffect">
-                                  <p:stCondLst>
-                                    <p:cond delay="0"/>
-                                  </p:stCondLst>
-                                  <p:childTnLst>
-                                    <p:set>
-                                      <p:cBhvr>
-                                        <p:cTn id="32" dur="1" fill="hold">
-                                          <p:stCondLst>
-                                            <p:cond delay="0"/>
-                                          </p:stCondLst>
-                                        </p:cTn>
-                                        <p:tgtEl>
-                                          <p:spTgt spid="39"/>
-                                        </p:tgtEl>
-                                        <p:attrNameLst>
-                                          <p:attrName>style.visibility</p:attrName>
-                                        </p:attrNameLst>
-                                      </p:cBhvr>
-                                      <p:to>
-                                        <p:strVal val="visible"/>
-                                      </p:to>
-                                    </p:set>
-                                    <p:animEffect transition="in" filter="dissolve">
-                                      <p:cBhvr>
-                                        <p:cTn id="33" dur="500"/>
-                                        <p:tgtEl>
-                                          <p:spTgt spid="39"/>
-                                        </p:tgtEl>
-                                      </p:cBhvr>
-                                    </p:animEffect>
-                                  </p:childTnLst>
-                                </p:cTn>
-                              </p:par>
-                            </p:childTnLst>
-                          </p:cTn>
-                        </p:par>
-                      </p:childTnLst>
-                    </p:cTn>
-                  </p:par>
-                  <p:par>
-                    <p:cTn id="34" fill="hold">
-                      <p:stCondLst>
-                        <p:cond delay="indefinite"/>
-                      </p:stCondLst>
-                      <p:childTnLst>
-                        <p:par>
-                          <p:cTn id="35" fill="hold">
-                            <p:stCondLst>
-                              <p:cond delay="0"/>
-                            </p:stCondLst>
-                            <p:childTnLst>
-                              <p:par>
-                                <p:cTn id="36" presetID="9" presetClass="entr" presetSubtype="0" fill="hold" grpId="0" nodeType="clickEffect">
-                                  <p:stCondLst>
-                                    <p:cond delay="0"/>
-                                  </p:stCondLst>
-                                  <p:childTnLst>
-                                    <p:set>
-                                      <p:cBhvr>
-                                        <p:cTn id="37" dur="1" fill="hold">
-                                          <p:stCondLst>
-                                            <p:cond delay="0"/>
-                                          </p:stCondLst>
-                                        </p:cTn>
-                                        <p:tgtEl>
-                                          <p:spTgt spid="47"/>
-                                        </p:tgtEl>
-                                        <p:attrNameLst>
-                                          <p:attrName>style.visibility</p:attrName>
-                                        </p:attrNameLst>
-                                      </p:cBhvr>
-                                      <p:to>
-                                        <p:strVal val="visible"/>
-                                      </p:to>
-                                    </p:set>
-                                    <p:animEffect transition="in" filter="dissolve">
-                                      <p:cBhvr>
-                                        <p:cTn id="38" dur="500"/>
-                                        <p:tgtEl>
-                                          <p:spTgt spid="47"/>
-                                        </p:tgtEl>
-                                      </p:cBhvr>
-                                    </p:animEffect>
-                                  </p:childTnLst>
-                                </p:cTn>
-                              </p:par>
-                            </p:childTnLst>
-                          </p:cTn>
-                        </p:par>
-                      </p:childTnLst>
-                    </p:cTn>
-                  </p:par>
-                  <p:par>
-                    <p:cTn id="39" fill="hold">
-                      <p:stCondLst>
-                        <p:cond delay="indefinite"/>
-                      </p:stCondLst>
-                      <p:childTnLst>
-                        <p:par>
-                          <p:cTn id="40" fill="hold">
-                            <p:stCondLst>
-                              <p:cond delay="0"/>
-                            </p:stCondLst>
-                            <p:childTnLst>
-                              <p:par>
-                                <p:cTn id="41" presetID="9" presetClass="entr" presetSubtype="0" fill="hold" grpId="0" nodeType="clickEffect">
-                                  <p:stCondLst>
-                                    <p:cond delay="0"/>
-                                  </p:stCondLst>
-                                  <p:childTnLst>
-                                    <p:set>
-                                      <p:cBhvr>
-                                        <p:cTn id="42" dur="1" fill="hold">
-                                          <p:stCondLst>
-                                            <p:cond delay="0"/>
-                                          </p:stCondLst>
-                                        </p:cTn>
-                                        <p:tgtEl>
-                                          <p:spTgt spid="54"/>
-                                        </p:tgtEl>
-                                        <p:attrNameLst>
-                                          <p:attrName>style.visibility</p:attrName>
-                                        </p:attrNameLst>
-                                      </p:cBhvr>
-                                      <p:to>
-                                        <p:strVal val="visible"/>
-                                      </p:to>
-                                    </p:set>
-                                    <p:animEffect transition="in" filter="dissolve">
-                                      <p:cBhvr>
-                                        <p:cTn id="43" dur="500"/>
-                                        <p:tgtEl>
-                                          <p:spTgt spid="54"/>
-                                        </p:tgtEl>
-                                      </p:cBhvr>
-                                    </p:animEffect>
-                                  </p:childTnLst>
-                                </p:cTn>
-                              </p:par>
-                            </p:childTnLst>
-                          </p:cTn>
-                        </p:par>
-                      </p:childTnLst>
-                    </p:cTn>
-                  </p:par>
-                  <p:par>
-                    <p:cTn id="44" fill="hold">
-                      <p:stCondLst>
-                        <p:cond delay="indefinite"/>
-                      </p:stCondLst>
-                      <p:childTnLst>
-                        <p:par>
-                          <p:cTn id="45" fill="hold">
-                            <p:stCondLst>
-                              <p:cond delay="0"/>
-                            </p:stCondLst>
-                            <p:childTnLst>
-                              <p:par>
-                                <p:cTn id="46" presetID="9" presetClass="entr" presetSubtype="0" fill="hold" grpId="0" nodeType="clickEffect">
-                                  <p:stCondLst>
-                                    <p:cond delay="0"/>
-                                  </p:stCondLst>
-                                  <p:childTnLst>
-                                    <p:set>
-                                      <p:cBhvr>
-                                        <p:cTn id="47" dur="1" fill="hold">
-                                          <p:stCondLst>
-                                            <p:cond delay="0"/>
-                                          </p:stCondLst>
-                                        </p:cTn>
-                                        <p:tgtEl>
-                                          <p:spTgt spid="55"/>
-                                        </p:tgtEl>
-                                        <p:attrNameLst>
-                                          <p:attrName>style.visibility</p:attrName>
-                                        </p:attrNameLst>
-                                      </p:cBhvr>
-                                      <p:to>
-                                        <p:strVal val="visible"/>
-                                      </p:to>
-                                    </p:set>
-                                    <p:animEffect transition="in" filter="dissolve">
-                                      <p:cBhvr>
-                                        <p:cTn id="48" dur="500"/>
-                                        <p:tgtEl>
-                                          <p:spTgt spid="55"/>
-                                        </p:tgtEl>
-                                      </p:cBhvr>
-                                    </p:animEffect>
-                                  </p:childTnLst>
-                                </p:cTn>
-                              </p:par>
-                            </p:childTnLst>
-                          </p:cTn>
-                        </p:par>
-                      </p:childTnLst>
-                    </p:cTn>
-                  </p:par>
-                  <p:par>
-                    <p:cTn id="49" fill="hold">
-                      <p:stCondLst>
-                        <p:cond delay="indefinite"/>
-                      </p:stCondLst>
-                      <p:childTnLst>
-                        <p:par>
-                          <p:cTn id="50" fill="hold">
-                            <p:stCondLst>
-                              <p:cond delay="0"/>
-                            </p:stCondLst>
-                            <p:childTnLst>
-                              <p:par>
-                                <p:cTn id="51" presetID="9" presetClass="entr" presetSubtype="0" fill="hold" grpId="0" nodeType="clickEffect">
-                                  <p:stCondLst>
-                                    <p:cond delay="0"/>
-                                  </p:stCondLst>
-                                  <p:childTnLst>
-                                    <p:set>
-                                      <p:cBhvr>
-                                        <p:cTn id="52" dur="1" fill="hold">
-                                          <p:stCondLst>
-                                            <p:cond delay="0"/>
-                                          </p:stCondLst>
-                                        </p:cTn>
-                                        <p:tgtEl>
-                                          <p:spTgt spid="58"/>
-                                        </p:tgtEl>
-                                        <p:attrNameLst>
-                                          <p:attrName>style.visibility</p:attrName>
-                                        </p:attrNameLst>
-                                      </p:cBhvr>
-                                      <p:to>
-                                        <p:strVal val="visible"/>
-                                      </p:to>
-                                    </p:set>
-                                    <p:animEffect transition="in" filter="dissolve">
-                                      <p:cBhvr>
-                                        <p:cTn id="53" dur="500"/>
-                                        <p:tgtEl>
-                                          <p:spTgt spid="58"/>
-                                        </p:tgtEl>
-                                      </p:cBhvr>
-                                    </p:animEffect>
-                                  </p:childTnLst>
-                                </p:cTn>
-                              </p:par>
-                              <p:par>
-                                <p:cTn id="54" presetID="9" presetClass="entr" presetSubtype="0" fill="hold" nodeType="withEffect">
-                                  <p:stCondLst>
-                                    <p:cond delay="0"/>
-                                  </p:stCondLst>
-                                  <p:childTnLst>
-                                    <p:set>
-                                      <p:cBhvr>
-                                        <p:cTn id="55" dur="1" fill="hold">
-                                          <p:stCondLst>
-                                            <p:cond delay="0"/>
-                                          </p:stCondLst>
-                                        </p:cTn>
-                                        <p:tgtEl>
-                                          <p:spTgt spid="59"/>
-                                        </p:tgtEl>
-                                        <p:attrNameLst>
-                                          <p:attrName>style.visibility</p:attrName>
-                                        </p:attrNameLst>
-                                      </p:cBhvr>
-                                      <p:to>
-                                        <p:strVal val="visible"/>
-                                      </p:to>
-                                    </p:set>
-                                    <p:animEffect transition="in" filter="dissolve">
-                                      <p:cBhvr>
-                                        <p:cTn id="56" dur="500"/>
-                                        <p:tgtEl>
-                                          <p:spTgt spid="59"/>
-                                        </p:tgtEl>
-                                      </p:cBhvr>
-                                    </p:animEffect>
-                                  </p:childTnLst>
-                                </p:cTn>
-                              </p:par>
-                              <p:par>
-                                <p:cTn id="57" presetID="9" presetClass="entr" presetSubtype="0" fill="hold" grpId="0" nodeType="withEffect">
-                                  <p:stCondLst>
-                                    <p:cond delay="0"/>
-                                  </p:stCondLst>
-                                  <p:childTnLst>
-                                    <p:set>
-                                      <p:cBhvr>
-                                        <p:cTn id="58" dur="1" fill="hold">
-                                          <p:stCondLst>
-                                            <p:cond delay="0"/>
-                                          </p:stCondLst>
-                                        </p:cTn>
-                                        <p:tgtEl>
-                                          <p:spTgt spid="60"/>
-                                        </p:tgtEl>
-                                        <p:attrNameLst>
-                                          <p:attrName>style.visibility</p:attrName>
-                                        </p:attrNameLst>
-                                      </p:cBhvr>
-                                      <p:to>
-                                        <p:strVal val="visible"/>
-                                      </p:to>
-                                    </p:set>
-                                    <p:animEffect transition="in" filter="dissolve">
-                                      <p:cBhvr>
-                                        <p:cTn id="59" dur="500"/>
-                                        <p:tgtEl>
-                                          <p:spTgt spid="60"/>
-                                        </p:tgtEl>
-                                      </p:cBhvr>
-                                    </p:animEffect>
-                                  </p:childTnLst>
-                                </p:cTn>
-                              </p:par>
-                            </p:childTnLst>
-                          </p:cTn>
-                        </p:par>
-                      </p:childTnLst>
-                    </p:cTn>
-                  </p:par>
-                </p:childTnLst>
-              </p:cTn>
-              <p:prevCondLst>
-                <p:cond evt="onPrev" delay="0">
-                  <p:tgtEl>
-                    <p:sldTgt/>
-                  </p:tgtEl>
-                </p:cond>
-              </p:prevCondLst>
-              <p:nextCondLst>
-                <p:cond evt="onNext" delay="0">
-                  <p:tgtEl>
-                    <p:sldTgt/>
-                  </p:tgtEl>
-                </p:cond>
-              </p:nextCondLst>
-            </p:seq>
-          </p:childTnLst>
-        </p:cTn>
+        <p:cTn id="1" dur="indefinite" restart="never" nodeType="tmRoot"/>
       </p:par>
     </p:tnLst>
-    <p:bldLst>
-      <p:bldP spid="23" grpId="0"/>
-      <p:bldP spid="29" grpId="0" build="p" bldLvl="2"/>
-      <p:bldP spid="28" grpId="0" animBg="1"/>
-      <p:bldP spid="39" grpId="0"/>
-      <p:bldP spid="47" grpId="0"/>
-      <p:bldP spid="54" grpId="0"/>
-      <p:bldP spid="55" grpId="0"/>
-      <p:bldP spid="56" grpId="0" animBg="1"/>
-      <p:bldP spid="58" grpId="0"/>
-      <p:bldP spid="60" grpId="0"/>
-    </p:bldLst>
   </p:timing>
 </p:sld>
 </file>
@@ -12172,6 +11846,38 @@
           <a:chExt cx="0" cy="0"/>
         </a:xfrm>
       </p:grpSpPr>
+      <p:pic>
+        <p:nvPicPr>
+          <p:cNvPr id="112648" name="Picture 8"/>
+          <p:cNvPicPr>
+            <a:picLocks noChangeAspect="1" noChangeArrowheads="1"/>
+          </p:cNvPicPr>
+          <p:nvPr/>
+        </p:nvPicPr>
+        <p:blipFill>
+          <a:blip r:embed="rId3" cstate="print"/>
+          <a:srcRect/>
+          <a:stretch>
+            <a:fillRect/>
+          </a:stretch>
+        </p:blipFill>
+        <p:spPr bwMode="auto">
+          <a:xfrm>
+            <a:off x="34925" y="1124744"/>
+            <a:ext cx="9101167" cy="5112568"/>
+          </a:xfrm>
+          <a:prstGeom prst="rect">
+            <a:avLst/>
+          </a:prstGeom>
+          <a:noFill/>
+          <a:ln w="9525">
+            <a:noFill/>
+            <a:miter lim="800000"/>
+            <a:headEnd/>
+            <a:tailEnd/>
+          </a:ln>
+        </p:spPr>
+      </p:pic>
       <p:sp>
         <p:nvSpPr>
           <p:cNvPr id="13" name="Textfeld 12"/>
@@ -12210,21 +11916,21 @@
                 </a:solidFill>
                 <a:latin typeface="Calibri" pitchFamily="34" charset="0"/>
               </a:rPr>
-              <a:t>Kalibrierung und Validierung</a:t>
+              <a:t>MOPEX</a:t>
             </a:r>
           </a:p>
         </p:txBody>
       </p:sp>
       <p:sp>
         <p:nvSpPr>
-          <p:cNvPr id="10" name="Textfeld 9"/>
+          <p:cNvPr id="28" name="Textfeld 27"/>
           <p:cNvSpPr txBox="1"/>
           <p:nvPr/>
         </p:nvSpPr>
         <p:spPr>
           <a:xfrm>
-            <a:off x="250825" y="765175"/>
-            <a:ext cx="4896544" cy="523220"/>
+            <a:off x="395288" y="765175"/>
+            <a:ext cx="8209037" cy="523220"/>
           </a:xfrm>
           <a:prstGeom prst="rect">
             <a:avLst/>
@@ -12241,7 +11947,73 @@
               <a:rPr lang="de-DE" sz="2800" dirty="0" smtClean="0">
                 <a:latin typeface="Calibri" pitchFamily="34" charset="0"/>
               </a:rPr>
-              <a:t>Modellvalidierung </a:t>
+              <a:t>MOPEX: </a:t>
+            </a:r>
+            <a:r>
+              <a:rPr lang="de-DE" sz="2800" b="1" dirty="0" err="1" smtClean="0">
+                <a:latin typeface="Calibri" pitchFamily="34" charset="0"/>
+              </a:rPr>
+              <a:t>MO</a:t>
+            </a:r>
+            <a:r>
+              <a:rPr lang="de-DE" sz="2800" dirty="0" err="1" smtClean="0">
+                <a:latin typeface="Calibri" pitchFamily="34" charset="0"/>
+              </a:rPr>
+              <a:t>del</a:t>
+            </a:r>
+            <a:r>
+              <a:rPr lang="de-DE" sz="2800" dirty="0" smtClean="0">
+                <a:latin typeface="Calibri" pitchFamily="34" charset="0"/>
+              </a:rPr>
+              <a:t> </a:t>
+            </a:r>
+            <a:r>
+              <a:rPr lang="de-DE" sz="2800" b="1" dirty="0" smtClean="0">
+                <a:latin typeface="Calibri" pitchFamily="34" charset="0"/>
+              </a:rPr>
+              <a:t>P</a:t>
+            </a:r>
+            <a:r>
+              <a:rPr lang="de-DE" sz="2800" dirty="0" smtClean="0">
+                <a:latin typeface="Calibri" pitchFamily="34" charset="0"/>
+              </a:rPr>
+              <a:t>arameter </a:t>
+            </a:r>
+            <a:r>
+              <a:rPr lang="de-DE" sz="2800" b="1" dirty="0" err="1" smtClean="0">
+                <a:latin typeface="Calibri" pitchFamily="34" charset="0"/>
+              </a:rPr>
+              <a:t>E</a:t>
+            </a:r>
+            <a:r>
+              <a:rPr lang="de-DE" sz="2800" dirty="0" err="1" smtClean="0">
+                <a:latin typeface="Calibri" pitchFamily="34" charset="0"/>
+              </a:rPr>
+              <a:t>stimation</a:t>
+            </a:r>
+            <a:r>
+              <a:rPr lang="de-DE" sz="2800" dirty="0" smtClean="0">
+                <a:latin typeface="Calibri" pitchFamily="34" charset="0"/>
+              </a:rPr>
+              <a:t> </a:t>
+            </a:r>
+            <a:r>
+              <a:rPr lang="de-DE" sz="2800" dirty="0" err="1" smtClean="0">
+                <a:latin typeface="Calibri" pitchFamily="34" charset="0"/>
+              </a:rPr>
+              <a:t>E</a:t>
+            </a:r>
+            <a:r>
+              <a:rPr lang="de-DE" sz="2800" b="1" dirty="0" err="1" smtClean="0">
+                <a:latin typeface="Calibri" pitchFamily="34" charset="0"/>
+              </a:rPr>
+              <a:t>X</a:t>
+            </a:r>
+            <a:r>
+              <a:rPr lang="de-DE" sz="2800" dirty="0" err="1" smtClean="0">
+                <a:latin typeface="Calibri" pitchFamily="34" charset="0"/>
+              </a:rPr>
+              <a:t>periment</a:t>
             </a:r>
             <a:endParaRPr lang="de-DE" sz="2800" dirty="0">
               <a:latin typeface="Calibri" pitchFamily="34" charset="0"/>
@@ -12251,115 +12023,22 @@
       </p:sp>
       <p:sp>
         <p:nvSpPr>
-          <p:cNvPr id="23" name="Textfeld 22"/>
+          <p:cNvPr id="36" name="Textfeld 35"/>
           <p:cNvSpPr txBox="1"/>
           <p:nvPr/>
         </p:nvSpPr>
         <p:spPr>
           <a:xfrm>
-            <a:off x="250825" y="1484784"/>
-            <a:ext cx="6049367" cy="400110"/>
-          </a:xfrm>
-          <a:prstGeom prst="rect">
-            <a:avLst/>
-          </a:prstGeom>
-          <a:noFill/>
-        </p:spPr>
-        <p:txBody>
-          <a:bodyPr wrap="square" rtlCol="0">
-            <a:spAutoFit/>
-          </a:bodyPr>
-          <a:lstStyle/>
-          <a:p>
-            <a:pPr>
-              <a:spcAft>
-                <a:spcPts val="600"/>
-              </a:spcAft>
-            </a:pPr>
-            <a:r>
-              <a:rPr lang="de-DE" sz="2000" b="1" dirty="0" smtClean="0">
-                <a:latin typeface="Calibri" pitchFamily="34" charset="0"/>
-              </a:rPr>
-              <a:t>Parameter des abcd-Modells sind alle „konzeptionell“:</a:t>
-            </a:r>
-          </a:p>
-        </p:txBody>
-      </p:sp>
-      <p:sp>
-        <p:nvSpPr>
-          <p:cNvPr id="29" name="Textfeld 28"/>
-          <p:cNvSpPr txBox="1"/>
-          <p:nvPr/>
-        </p:nvSpPr>
-        <p:spPr>
-          <a:xfrm>
-            <a:off x="250825" y="1916833"/>
-            <a:ext cx="6265391" cy="784830"/>
-          </a:xfrm>
-          <a:prstGeom prst="rect">
-            <a:avLst/>
-          </a:prstGeom>
-          <a:noFill/>
-        </p:spPr>
-        <p:txBody>
-          <a:bodyPr wrap="square" rtlCol="0">
-            <a:spAutoFit/>
-          </a:bodyPr>
-          <a:lstStyle/>
-          <a:p>
-            <a:pPr marL="273050" indent="-273050">
-              <a:spcAft>
-                <a:spcPts val="600"/>
-              </a:spcAft>
-              <a:buFont typeface="Wingdings" pitchFamily="2" charset="2"/>
-              <a:buChar char="§"/>
-              <a:tabLst>
-                <a:tab pos="273050" algn="l"/>
-              </a:tabLst>
-            </a:pPr>
-            <a:r>
-              <a:rPr lang="de-DE" sz="2000" dirty="0" smtClean="0">
-                <a:latin typeface="Calibri" pitchFamily="34" charset="0"/>
-              </a:rPr>
-              <a:t>Physikalisch interpretierbar, aber nicht messbar</a:t>
-            </a:r>
-          </a:p>
-          <a:p>
-            <a:pPr marL="273050" indent="-273050">
-              <a:spcAft>
-                <a:spcPts val="600"/>
-              </a:spcAft>
-              <a:buFont typeface="Wingdings" pitchFamily="2" charset="2"/>
-              <a:buChar char="§"/>
-              <a:tabLst>
-                <a:tab pos="273050" algn="l"/>
-              </a:tabLst>
-            </a:pPr>
-            <a:r>
-              <a:rPr lang="de-DE" sz="2000" dirty="0" smtClean="0">
-                <a:latin typeface="Calibri" pitchFamily="34" charset="0"/>
-              </a:rPr>
-              <a:t>Wie kann ich dann aber die Parameterwerte wählen</a:t>
-            </a:r>
-          </a:p>
-        </p:txBody>
-      </p:sp>
-      <p:sp>
-        <p:nvSpPr>
-          <p:cNvPr id="15" name="Textfeld 14"/>
-          <p:cNvSpPr txBox="1"/>
-          <p:nvPr/>
-        </p:nvSpPr>
-        <p:spPr>
-          <a:xfrm>
-            <a:off x="0" y="2874144"/>
-            <a:ext cx="9144000" cy="1015663"/>
+            <a:off x="395288" y="1484313"/>
+            <a:ext cx="8569325" cy="1800493"/>
           </a:xfrm>
           <a:prstGeom prst="rect">
             <a:avLst/>
           </a:prstGeom>
           <a:solidFill>
-            <a:srgbClr val="2B5681"/>
+            <a:srgbClr val="FFFFFF">
+              <a:alpha val="50196"/>
+            </a:srgbClr>
           </a:solidFill>
         </p:spPr>
         <p:txBody>
@@ -12368,261 +12047,207 @@
           </a:bodyPr>
           <a:lstStyle/>
           <a:p>
-            <a:pPr algn="ctr">
-              <a:spcAft>
-                <a:spcPts val="600"/>
-              </a:spcAft>
-            </a:pPr>
-            <a:r>
-              <a:rPr lang="de-DE" sz="2000" dirty="0" smtClean="0">
-                <a:solidFill>
-                  <a:schemeClr val="accent5">
-                    <a:lumMod val="75000"/>
-                  </a:schemeClr>
-                </a:solidFill>
-                <a:latin typeface="Calibri" pitchFamily="34" charset="0"/>
-              </a:rPr>
-              <a:t>Suche</a:t>
-            </a:r>
-            <a:r>
-              <a:rPr lang="de-DE" sz="2000" dirty="0" smtClean="0">
-                <a:solidFill>
-                  <a:schemeClr val="bg1"/>
-                </a:solidFill>
-                <a:latin typeface="Calibri" pitchFamily="34" charset="0"/>
-              </a:rPr>
-              <a:t> eine Kombination von Parametern (</a:t>
-            </a:r>
-            <a:r>
-              <a:rPr lang="de-DE" sz="2000" dirty="0" smtClean="0">
-                <a:solidFill>
-                  <a:schemeClr val="bg1"/>
-                </a:solidFill>
-                <a:latin typeface="Courier New" pitchFamily="49" charset="0"/>
-                <a:cs typeface="Courier New" pitchFamily="49" charset="0"/>
-              </a:rPr>
-              <a:t>par</a:t>
-            </a:r>
-            <a:r>
-              <a:rPr lang="de-DE" sz="2000" dirty="0" smtClean="0">
-                <a:solidFill>
-                  <a:schemeClr val="bg1"/>
-                </a:solidFill>
-                <a:latin typeface="Calibri" pitchFamily="34" charset="0"/>
-              </a:rPr>
-              <a:t>), </a:t>
-            </a:r>
-            <a:br>
-              <a:rPr lang="de-DE" sz="2000" dirty="0" smtClean="0">
-                <a:solidFill>
-                  <a:schemeClr val="bg1"/>
-                </a:solidFill>
-                <a:latin typeface="Calibri" pitchFamily="34" charset="0"/>
-              </a:rPr>
-            </a:br>
-            <a:r>
-              <a:rPr lang="de-DE" sz="2000" dirty="0" smtClean="0">
-                <a:solidFill>
-                  <a:schemeClr val="bg1"/>
-                </a:solidFill>
-                <a:latin typeface="Calibri" pitchFamily="34" charset="0"/>
-              </a:rPr>
-              <a:t>so dass </a:t>
-            </a:r>
-            <a:r>
-              <a:rPr lang="de-DE" sz="2000" dirty="0" smtClean="0">
-                <a:solidFill>
-                  <a:schemeClr val="accent5">
-                    <a:lumMod val="75000"/>
-                  </a:schemeClr>
-                </a:solidFill>
-                <a:latin typeface="Calibri" pitchFamily="34" charset="0"/>
-              </a:rPr>
-              <a:t>Beobachtung</a:t>
-            </a:r>
-            <a:r>
-              <a:rPr lang="de-DE" sz="2000" dirty="0" smtClean="0">
-                <a:solidFill>
-                  <a:schemeClr val="bg1"/>
-                </a:solidFill>
-                <a:latin typeface="Calibri" pitchFamily="34" charset="0"/>
-              </a:rPr>
-              <a:t> und </a:t>
-            </a:r>
-            <a:r>
-              <a:rPr lang="de-DE" sz="2000" dirty="0" smtClean="0">
-                <a:solidFill>
-                  <a:schemeClr val="accent5">
-                    <a:lumMod val="75000"/>
-                  </a:schemeClr>
-                </a:solidFill>
-                <a:latin typeface="Calibri" pitchFamily="34" charset="0"/>
-              </a:rPr>
-              <a:t>Simulation</a:t>
-            </a:r>
-            <a:r>
-              <a:rPr lang="de-DE" sz="2000" dirty="0" smtClean="0">
-                <a:solidFill>
-                  <a:schemeClr val="bg1"/>
-                </a:solidFill>
-                <a:latin typeface="Calibri" pitchFamily="34" charset="0"/>
-              </a:rPr>
-              <a:t> </a:t>
-            </a:r>
-            <a:br>
-              <a:rPr lang="de-DE" sz="2000" dirty="0" smtClean="0">
-                <a:solidFill>
-                  <a:schemeClr val="bg1"/>
-                </a:solidFill>
-                <a:latin typeface="Calibri" pitchFamily="34" charset="0"/>
-              </a:rPr>
-            </a:br>
-            <a:r>
-              <a:rPr lang="de-DE" sz="2000" dirty="0" smtClean="0">
-                <a:solidFill>
-                  <a:schemeClr val="bg1"/>
-                </a:solidFill>
-                <a:latin typeface="Calibri" pitchFamily="34" charset="0"/>
-              </a:rPr>
-              <a:t>möglichst gut </a:t>
-            </a:r>
-            <a:r>
-              <a:rPr lang="de-DE" sz="2000" dirty="0" smtClean="0">
-                <a:solidFill>
-                  <a:schemeClr val="accent5">
-                    <a:lumMod val="75000"/>
-                  </a:schemeClr>
-                </a:solidFill>
-                <a:latin typeface="Calibri" pitchFamily="34" charset="0"/>
-              </a:rPr>
-              <a:t>übereinstimmen</a:t>
-            </a:r>
-            <a:r>
-              <a:rPr lang="de-DE" sz="2000" dirty="0" smtClean="0">
-                <a:solidFill>
-                  <a:schemeClr val="bg1"/>
-                </a:solidFill>
-                <a:latin typeface="Calibri" pitchFamily="34" charset="0"/>
-              </a:rPr>
-              <a:t>.</a:t>
-            </a:r>
-          </a:p>
-        </p:txBody>
-      </p:sp>
-      <p:sp>
-        <p:nvSpPr>
-          <p:cNvPr id="16" name="Textfeld 15"/>
-          <p:cNvSpPr txBox="1"/>
-          <p:nvPr/>
-        </p:nvSpPr>
-        <p:spPr>
-          <a:xfrm>
-            <a:off x="250825" y="4084330"/>
-            <a:ext cx="8893176" cy="1862048"/>
-          </a:xfrm>
-          <a:prstGeom prst="rect">
-            <a:avLst/>
-          </a:prstGeom>
-          <a:noFill/>
-        </p:spPr>
-        <p:txBody>
-          <a:bodyPr wrap="square" rtlCol="0">
-            <a:spAutoFit/>
-          </a:bodyPr>
-          <a:lstStyle/>
-          <a:p>
-            <a:pPr>
-              <a:spcAft>
-                <a:spcPts val="600"/>
-              </a:spcAft>
-              <a:tabLst>
-                <a:tab pos="0" algn="l"/>
-              </a:tabLst>
-            </a:pPr>
-            <a:r>
-              <a:rPr lang="de-DE" sz="2000" dirty="0" smtClean="0">
-                <a:latin typeface="Calibri" pitchFamily="34" charset="0"/>
-              </a:rPr>
-              <a:t>Aber funktionieren die „optimalen“ Parameter auch für Zeiträume, </a:t>
-            </a:r>
-            <a:br>
-              <a:rPr lang="de-DE" sz="2000" dirty="0" smtClean="0">
-                <a:latin typeface="Calibri" pitchFamily="34" charset="0"/>
-              </a:rPr>
-            </a:br>
-            <a:r>
-              <a:rPr lang="de-DE" sz="2000" dirty="0" smtClean="0">
-                <a:latin typeface="Calibri" pitchFamily="34" charset="0"/>
-              </a:rPr>
-              <a:t>die ich nicht für die Kalibrierung genutzt habe?</a:t>
-            </a:r>
-          </a:p>
-          <a:p>
-            <a:pPr marL="444500" indent="-444500">
+            <a:pPr marL="355600" indent="-355600">
               <a:spcAft>
                 <a:spcPts val="600"/>
               </a:spcAft>
               <a:buFont typeface="Wingdings" pitchFamily="2" charset="2"/>
-              <a:buChar char="ð"/>
-              <a:tabLst>
-                <a:tab pos="444500" algn="l"/>
-              </a:tabLst>
+              <a:buChar char="§"/>
             </a:pPr>
             <a:r>
-              <a:rPr lang="de-DE" sz="2000" dirty="0" smtClean="0">
+              <a:rPr lang="de-DE" sz="2400" dirty="0" smtClean="0">
                 <a:latin typeface="Calibri" pitchFamily="34" charset="0"/>
-                <a:sym typeface="Wingdings"/>
               </a:rPr>
-              <a:t>teile den Datensatz (z.B. Abflussmessung) in z.B. zwei Hälften</a:t>
-            </a:r>
-          </a:p>
-          <a:p>
-            <a:pPr marL="444500" indent="-444500">
+              <a:t>homogener Datensatz für 431 Einzugsgebiete in den USA</a:t>
+            </a:r>
+          </a:p>
+          <a:p>
+            <a:pPr marL="355600" indent="-355600">
               <a:spcAft>
                 <a:spcPts val="600"/>
               </a:spcAft>
               <a:buFont typeface="Wingdings" pitchFamily="2" charset="2"/>
-              <a:buChar char="ð"/>
-              <a:tabLst>
-                <a:tab pos="444500" algn="l"/>
-              </a:tabLst>
+              <a:buChar char="§"/>
             </a:pPr>
             <a:r>
-              <a:rPr lang="de-DE" sz="2000" dirty="0" smtClean="0">
+              <a:rPr lang="de-DE" sz="2400" dirty="0" smtClean="0">
                 <a:latin typeface="Calibri" pitchFamily="34" charset="0"/>
-                <a:sym typeface="Wingdings"/>
               </a:rPr>
-              <a:t>nutze den ersten Teil zur Kalibrierung</a:t>
-            </a:r>
-          </a:p>
-          <a:p>
-            <a:pPr marL="444500" indent="-444500">
+              <a:t>Abflusszeitreihen</a:t>
+            </a:r>
+          </a:p>
+          <a:p>
+            <a:pPr marL="355600" indent="-355600">
               <a:spcAft>
                 <a:spcPts val="600"/>
               </a:spcAft>
               <a:buFont typeface="Wingdings" pitchFamily="2" charset="2"/>
-              <a:buChar char="ð"/>
-              <a:tabLst>
-                <a:tab pos="444500" algn="l"/>
-              </a:tabLst>
+              <a:buChar char="§"/>
             </a:pPr>
             <a:r>
-              <a:rPr lang="de-DE" sz="2000" dirty="0" smtClean="0">
+              <a:rPr lang="de-DE" sz="2400" dirty="0" smtClean="0">
                 <a:latin typeface="Calibri" pitchFamily="34" charset="0"/>
-                <a:sym typeface="Wingdings"/>
               </a:rPr>
-              <a:t>prüfe den „optimalen“ Parametersatz an der zweiten Hälfte</a:t>
+              <a:t>Gebietsmittelwerte für Niederschlag, PET, </a:t>
+            </a:r>
+            <a:r>
+              <a:rPr lang="de-DE" sz="2400" dirty="0" err="1" smtClean="0">
+                <a:latin typeface="Calibri" pitchFamily="34" charset="0"/>
+              </a:rPr>
+              <a:t>T</a:t>
+            </a:r>
+            <a:r>
+              <a:rPr lang="de-DE" sz="2400" baseline="-25000" dirty="0" err="1" smtClean="0">
+                <a:latin typeface="Calibri" pitchFamily="34" charset="0"/>
+              </a:rPr>
+              <a:t>min</a:t>
+            </a:r>
+            <a:r>
+              <a:rPr lang="de-DE" sz="2400" dirty="0" smtClean="0">
+                <a:latin typeface="Calibri" pitchFamily="34" charset="0"/>
+              </a:rPr>
+              <a:t>, </a:t>
+            </a:r>
+            <a:r>
+              <a:rPr lang="de-DE" sz="2400" dirty="0" err="1" smtClean="0">
+                <a:latin typeface="Calibri" pitchFamily="34" charset="0"/>
+              </a:rPr>
+              <a:t>T</a:t>
+            </a:r>
+            <a:r>
+              <a:rPr lang="de-DE" sz="2400" baseline="-25000" dirty="0" err="1" smtClean="0">
+                <a:latin typeface="Calibri" pitchFamily="34" charset="0"/>
+              </a:rPr>
+              <a:t>max</a:t>
+            </a:r>
+            <a:endParaRPr lang="de-DE" sz="2400" baseline="-25000" dirty="0" smtClean="0">
+              <a:latin typeface="Calibri" pitchFamily="34" charset="0"/>
+            </a:endParaRPr>
+          </a:p>
+          <a:p>
+            <a:pPr marL="355600" indent="-355600">
+              <a:spcAft>
+                <a:spcPts val="600"/>
+              </a:spcAft>
+              <a:buFont typeface="Wingdings" pitchFamily="2" charset="2"/>
+              <a:buChar char="§"/>
+            </a:pPr>
+            <a:r>
+              <a:rPr lang="de-DE" sz="2400" dirty="0" smtClean="0">
+                <a:latin typeface="Calibri" pitchFamily="34" charset="0"/>
+              </a:rPr>
+              <a:t>tägliche Auflösung (für diesen Kurs: Monatsmittelwerte)</a:t>
             </a:r>
           </a:p>
         </p:txBody>
       </p:sp>
+      <p:grpSp>
+        <p:nvGrpSpPr>
+          <p:cNvPr id="11" name="Gruppieren 10"/>
+          <p:cNvGrpSpPr/>
+          <p:nvPr/>
+        </p:nvGrpSpPr>
+        <p:grpSpPr>
+          <a:xfrm>
+            <a:off x="0" y="3717032"/>
+            <a:ext cx="9144000" cy="1080120"/>
+            <a:chOff x="0" y="3717032"/>
+            <a:chExt cx="9144000" cy="1080120"/>
+          </a:xfrm>
+        </p:grpSpPr>
+        <p:sp>
+          <p:nvSpPr>
+            <p:cNvPr id="43" name="Textfeld 42"/>
+            <p:cNvSpPr txBox="1"/>
+            <p:nvPr/>
+          </p:nvSpPr>
+          <p:spPr>
+            <a:xfrm>
+              <a:off x="0" y="4243154"/>
+              <a:ext cx="9144000" cy="553998"/>
+            </a:xfrm>
+            <a:prstGeom prst="rect">
+              <a:avLst/>
+            </a:prstGeom>
+            <a:solidFill>
+              <a:srgbClr val="FFFFFF">
+                <a:alpha val="50196"/>
+              </a:srgbClr>
+            </a:solidFill>
+          </p:spPr>
+          <p:txBody>
+            <a:bodyPr wrap="square" rtlCol="0">
+              <a:spAutoFit/>
+            </a:bodyPr>
+            <a:lstStyle/>
+            <a:p>
+              <a:pPr algn="ctr"/>
+              <a:r>
+                <a:rPr lang="de-DE" sz="3000" dirty="0" smtClean="0">
+                  <a:latin typeface="Calibri" pitchFamily="34" charset="0"/>
+                  <a:hlinkClick r:id="rId4"/>
+                </a:rPr>
+                <a:t>ftp://hydrology.nws.noaa.gov/pub/gcip/mopex/US_Data</a:t>
+              </a:r>
+              <a:r>
+                <a:rPr lang="de-DE" sz="3000" dirty="0" smtClean="0">
+                  <a:latin typeface="Calibri" pitchFamily="34" charset="0"/>
+                </a:rPr>
+                <a:t> </a:t>
+              </a:r>
+              <a:endParaRPr lang="de-DE" sz="3000" dirty="0">
+                <a:latin typeface="Calibri" pitchFamily="34" charset="0"/>
+              </a:endParaRPr>
+            </a:p>
+          </p:txBody>
+        </p:sp>
+        <p:sp>
+          <p:nvSpPr>
+            <p:cNvPr id="44" name="Textfeld 43"/>
+            <p:cNvSpPr txBox="1"/>
+            <p:nvPr/>
+          </p:nvSpPr>
+          <p:spPr>
+            <a:xfrm>
+              <a:off x="0" y="3717032"/>
+              <a:ext cx="9144000" cy="553998"/>
+            </a:xfrm>
+            <a:prstGeom prst="rect">
+              <a:avLst/>
+            </a:prstGeom>
+            <a:solidFill>
+              <a:srgbClr val="FFFFFF">
+                <a:alpha val="50196"/>
+              </a:srgbClr>
+            </a:solidFill>
+          </p:spPr>
+          <p:txBody>
+            <a:bodyPr wrap="square" rtlCol="0">
+              <a:spAutoFit/>
+            </a:bodyPr>
+            <a:lstStyle/>
+            <a:p>
+              <a:pPr algn="ctr"/>
+              <a:r>
+                <a:rPr lang="de-DE" sz="3000" dirty="0" smtClean="0">
+                  <a:latin typeface="Calibri" pitchFamily="34" charset="0"/>
+                </a:rPr>
+                <a:t>Download der Daten und Metadaten: </a:t>
+              </a:r>
+              <a:endParaRPr lang="de-DE" sz="3000" dirty="0">
+                <a:latin typeface="Calibri" pitchFamily="34" charset="0"/>
+              </a:endParaRPr>
+            </a:p>
+          </p:txBody>
+        </p:sp>
+      </p:grpSp>
     </p:spTree>
   </p:cSld>
   <p:clrMapOvr>
     <a:masterClrMapping/>
   </p:clrMapOvr>
   <p:transition>
-    <p:zoom/>
+    <p:split/>
   </p:transition>
   <p:timing>
     <p:tnLst>
@@ -12658,11 +12283,7 @@
                                           </p:stCondLst>
                                         </p:cTn>
                                         <p:tgtEl>
-                                          <p:spTgt spid="16">
-                                            <p:txEl>
-                                              <p:pRg st="0" end="0"/>
-                                            </p:txEl>
-                                          </p:spTgt>
+                                          <p:spTgt spid="36"/>
                                         </p:tgtEl>
                                         <p:attrNameLst>
                                           <p:attrName>style.visibility</p:attrName>
@@ -12676,11 +12297,7 @@
                                       <p:cBhvr>
                                         <p:cTn id="7" dur="500"/>
                                         <p:tgtEl>
-                                          <p:spTgt spid="16">
-                                            <p:txEl>
-                                              <p:pRg st="0" end="0"/>
-                                            </p:txEl>
-                                          </p:spTgt>
+                                          <p:spTgt spid="36"/>
                                         </p:tgtEl>
                                       </p:cBhvr>
                                     </p:animEffect>
@@ -12706,7 +12323,7 @@
                             </p:stCondLst>
                             <p:childTnLst>
                               <p:par>
-                                <p:cTn id="10" presetID="22" presetClass="entr" presetSubtype="1" fill="hold" grpId="0" nodeType="clickEffect">
+                                <p:cTn id="10" presetID="23" presetClass="entr" presetSubtype="288" fill="hold" nodeType="clickEffect">
                                   <p:stCondLst>
                                     <p:cond delay="0"/>
                                   </p:stCondLst>
@@ -12719,11 +12336,7 @@
                                           </p:stCondLst>
                                         </p:cTn>
                                         <p:tgtEl>
-                                          <p:spTgt spid="16">
-                                            <p:txEl>
-                                              <p:pRg st="1" end="1"/>
-                                            </p:txEl>
-                                          </p:spTgt>
+                                          <p:spTgt spid="11"/>
                                         </p:tgtEl>
                                         <p:attrNameLst>
                                           <p:attrName>style.visibility</p:attrName>
@@ -12733,140 +12346,52 @@
                                         <p:strVal val="visible"/>
                                       </p:to>
                                     </p:set>
-                                    <p:animEffect transition="in" filter="wipe(up)">
+                                    <p:anim calcmode="lin" valueType="num">
                                       <p:cBhvr>
-                                        <p:cTn id="12" dur="500"/>
+                                        <p:cTn id="12" dur="500" fill="hold"/>
                                         <p:tgtEl>
-                                          <p:spTgt spid="16">
-                                            <p:txEl>
-                                              <p:pRg st="1" end="1"/>
-                                            </p:txEl>
-                                          </p:spTgt>
-                                        </p:tgtEl>
-                                      </p:cBhvr>
-                                    </p:animEffect>
-                                  </p:childTnLst>
-                                </p:cTn>
-                              </p:par>
-                            </p:childTnLst>
-                          </p:cTn>
-                        </p:par>
-                      </p:childTnLst>
-                    </p:cTn>
-                  </p:par>
-                  <p:par>
-                    <p:cTn id="13" fill="hold">
-                      <p:stCondLst>
-                        <p:cond delay="indefinite"/>
-                      </p:stCondLst>
-                      <p:childTnLst>
-                        <p:par>
-                          <p:cTn id="14" fill="hold">
-                            <p:stCondLst>
-                              <p:cond delay="0"/>
-                            </p:stCondLst>
-                            <p:childTnLst>
-                              <p:par>
-                                <p:cTn id="15" presetID="22" presetClass="entr" presetSubtype="1" fill="hold" grpId="0" nodeType="clickEffect">
-                                  <p:stCondLst>
-                                    <p:cond delay="0"/>
-                                  </p:stCondLst>
-                                  <p:childTnLst>
-                                    <p:set>
-                                      <p:cBhvr>
-                                        <p:cTn id="16" dur="1" fill="hold">
-                                          <p:stCondLst>
-                                            <p:cond delay="0"/>
-                                          </p:stCondLst>
-                                        </p:cTn>
-                                        <p:tgtEl>
-                                          <p:spTgt spid="16">
-                                            <p:txEl>
-                                              <p:pRg st="2" end="2"/>
-                                            </p:txEl>
-                                          </p:spTgt>
+                                          <p:spTgt spid="11"/>
                                         </p:tgtEl>
                                         <p:attrNameLst>
-                                          <p:attrName>style.visibility</p:attrName>
+                                          <p:attrName>ppt_w</p:attrName>
                                         </p:attrNameLst>
                                       </p:cBhvr>
-                                      <p:to>
-                                        <p:strVal val="visible"/>
-                                      </p:to>
-                                    </p:set>
-                                    <p:animEffect transition="in" filter="wipe(up)">
+                                      <p:tavLst>
+                                        <p:tav tm="0">
+                                          <p:val>
+                                            <p:strVal val="4/3*#ppt_w"/>
+                                          </p:val>
+                                        </p:tav>
+                                        <p:tav tm="100000">
+                                          <p:val>
+                                            <p:strVal val="#ppt_w"/>
+                                          </p:val>
+                                        </p:tav>
+                                      </p:tavLst>
+                                    </p:anim>
+                                    <p:anim calcmode="lin" valueType="num">
                                       <p:cBhvr>
-                                        <p:cTn id="17" dur="500"/>
+                                        <p:cTn id="13" dur="500" fill="hold"/>
                                         <p:tgtEl>
-                                          <p:spTgt spid="16">
-                                            <p:txEl>
-                                              <p:pRg st="2" end="2"/>
-                                            </p:txEl>
-                                          </p:spTgt>
-                                        </p:tgtEl>
-                                      </p:cBhvr>
-                                    </p:animEffect>
-                                  </p:childTnLst>
-                                </p:cTn>
-                              </p:par>
-                            </p:childTnLst>
-                          </p:cTn>
-                        </p:par>
-                      </p:childTnLst>
-                    </p:cTn>
-                  </p:par>
-                  <p:par>
-                    <p:cTn id="18" fill="hold">
-                      <p:stCondLst>
-                        <p:cond delay="indefinite"/>
-                      </p:stCondLst>
-                      <p:childTnLst>
-                        <p:par>
-                          <p:cTn id="19" fill="hold">
-                            <p:stCondLst>
-                              <p:cond delay="0"/>
-                            </p:stCondLst>
-                            <p:childTnLst>
-                              <p:par>
-                                <p:cTn id="20" presetID="22" presetClass="entr" presetSubtype="1" fill="hold" grpId="0" nodeType="clickEffect">
-                                  <p:stCondLst>
-                                    <p:cond delay="0"/>
-                                  </p:stCondLst>
-                                  <p:childTnLst>
-                                    <p:set>
-                                      <p:cBhvr>
-                                        <p:cTn id="21" dur="1" fill="hold">
-                                          <p:stCondLst>
-                                            <p:cond delay="0"/>
-                                          </p:stCondLst>
-                                        </p:cTn>
-                                        <p:tgtEl>
-                                          <p:spTgt spid="16">
-                                            <p:txEl>
-                                              <p:pRg st="3" end="3"/>
-                                            </p:txEl>
-                                          </p:spTgt>
+                                          <p:spTgt spid="11"/>
                                         </p:tgtEl>
                                         <p:attrNameLst>
-                                          <p:attrName>style.visibility</p:attrName>
+                                          <p:attrName>ppt_h</p:attrName>
                                         </p:attrNameLst>
                                       </p:cBhvr>
-                                      <p:to>
-                                        <p:strVal val="visible"/>
-                                      </p:to>
-                                    </p:set>
-                                    <p:animEffect transition="in" filter="wipe(up)">
-                                      <p:cBhvr>
-                                        <p:cTn id="22" dur="500"/>
-                                        <p:tgtEl>
-                                          <p:spTgt spid="16">
-                                            <p:txEl>
-                                              <p:pRg st="3" end="3"/>
-                                            </p:txEl>
-                                          </p:spTgt>
-                                        </p:tgtEl>
-                                      </p:cBhvr>
-                                    </p:animEffect>
+                                      <p:tavLst>
+                                        <p:tav tm="0">
+                                          <p:val>
+                                            <p:strVal val="4/3*#ppt_h"/>
+                                          </p:val>
+                                        </p:tav>
+                                        <p:tav tm="100000">
+                                          <p:val>
+                                            <p:strVal val="#ppt_h"/>
+                                          </p:val>
+                                        </p:tav>
+                                      </p:tavLst>
+                                    </p:anim>
                                   </p:childTnLst>
                                 </p:cTn>
                               </p:par>
@@ -12898,7 +12423,7 @@
       </p:par>
     </p:tnLst>
     <p:bldLst>
-      <p:bldP spid="16" grpId="0" build="p" bldLvl="2"/>
+      <p:bldP spid="36" grpId="0" animBg="1"/>
     </p:bldLst>
   </p:timing>
 </p:sld>

</xml_diff>